<commit_message>
Added experiment results and references.
</commit_message>
<xml_diff>
--- a/docs/knapsack_presentation.pptx
+++ b/docs/knapsack_presentation.pptx
@@ -5,7 +5,7 @@
     <p:sldMasterId id="2147483648" r:id="rId1"/>
   </p:sldMasterIdLst>
   <p:notesMasterIdLst>
-    <p:notesMasterId r:id="rId15"/>
+    <p:notesMasterId r:id="rId20"/>
   </p:notesMasterIdLst>
   <p:sldIdLst>
     <p:sldId id="256" r:id="rId2"/>
@@ -21,6 +21,11 @@
     <p:sldId id="267" r:id="rId12"/>
     <p:sldId id="268" r:id="rId13"/>
     <p:sldId id="269" r:id="rId14"/>
+    <p:sldId id="270" r:id="rId15"/>
+    <p:sldId id="271" r:id="rId16"/>
+    <p:sldId id="272" r:id="rId17"/>
+    <p:sldId id="273" r:id="rId18"/>
+    <p:sldId id="274" r:id="rId19"/>
   </p:sldIdLst>
   <p:sldSz cx="9144000" cy="6858000" type="screen4x3"/>
   <p:notesSz cx="6858000" cy="9144000"/>
@@ -706,6 +711,426 @@
             <a:fld id="{13601C0D-AD39-8143-8175-88B781727A80}" type="slidenum">
               <a:rPr lang="en-US" smtClean="0"/>
               <a:t>13</a:t>
+            </a:fld>
+            <a:endParaRPr lang="en-US"/>
+          </a:p>
+        </p:txBody>
+      </p:sp>
+    </p:spTree>
+    <p:extLst>
+      <p:ext uri="{BB962C8B-B14F-4D97-AF65-F5344CB8AC3E}">
+        <p14:creationId xmlns:p14="http://schemas.microsoft.com/office/powerpoint/2010/main" val="4165162000"/>
+      </p:ext>
+    </p:extLst>
+  </p:cSld>
+  <p:clrMapOvr>
+    <a:masterClrMapping/>
+  </p:clrMapOvr>
+</p:notes>
+</file>
+
+<file path=ppt/notesSlides/notesSlide4.xml><?xml version="1.0" encoding="utf-8"?>
+<p:notes xmlns:a="http://schemas.openxmlformats.org/drawingml/2006/main" xmlns:r="http://schemas.openxmlformats.org/officeDocument/2006/relationships" xmlns:p="http://schemas.openxmlformats.org/presentationml/2006/main">
+  <p:cSld>
+    <p:spTree>
+      <p:nvGrpSpPr>
+        <p:cNvPr id="1" name=""/>
+        <p:cNvGrpSpPr/>
+        <p:nvPr/>
+      </p:nvGrpSpPr>
+      <p:grpSpPr>
+        <a:xfrm>
+          <a:off x="0" y="0"/>
+          <a:ext cx="0" cy="0"/>
+          <a:chOff x="0" y="0"/>
+          <a:chExt cx="0" cy="0"/>
+        </a:xfrm>
+      </p:grpSpPr>
+      <p:sp>
+        <p:nvSpPr>
+          <p:cNvPr id="2" name="Slide Image Placeholder 1"/>
+          <p:cNvSpPr>
+            <a:spLocks noGrp="1" noRot="1" noChangeAspect="1"/>
+          </p:cNvSpPr>
+          <p:nvPr>
+            <p:ph type="sldImg"/>
+          </p:nvPr>
+        </p:nvSpPr>
+        <p:spPr/>
+      </p:sp>
+      <p:sp>
+        <p:nvSpPr>
+          <p:cNvPr id="3" name="Notes Placeholder 2"/>
+          <p:cNvSpPr>
+            <a:spLocks noGrp="1"/>
+          </p:cNvSpPr>
+          <p:nvPr>
+            <p:ph type="body" idx="1"/>
+          </p:nvPr>
+        </p:nvSpPr>
+        <p:spPr/>
+        <p:txBody>
+          <a:bodyPr/>
+          <a:lstStyle/>
+          <a:p>
+            <a:endParaRPr lang="en-US" dirty="0"/>
+          </a:p>
+        </p:txBody>
+      </p:sp>
+      <p:sp>
+        <p:nvSpPr>
+          <p:cNvPr id="4" name="Slide Number Placeholder 3"/>
+          <p:cNvSpPr>
+            <a:spLocks noGrp="1"/>
+          </p:cNvSpPr>
+          <p:nvPr>
+            <p:ph type="sldNum" sz="quarter" idx="10"/>
+          </p:nvPr>
+        </p:nvSpPr>
+        <p:spPr/>
+        <p:txBody>
+          <a:bodyPr/>
+          <a:lstStyle/>
+          <a:p>
+            <a:fld id="{13601C0D-AD39-8143-8175-88B781727A80}" type="slidenum">
+              <a:rPr lang="en-US" smtClean="0"/>
+              <a:t>14</a:t>
+            </a:fld>
+            <a:endParaRPr lang="en-US"/>
+          </a:p>
+        </p:txBody>
+      </p:sp>
+    </p:spTree>
+    <p:extLst>
+      <p:ext uri="{BB962C8B-B14F-4D97-AF65-F5344CB8AC3E}">
+        <p14:creationId xmlns:p14="http://schemas.microsoft.com/office/powerpoint/2010/main" val="4165162000"/>
+      </p:ext>
+    </p:extLst>
+  </p:cSld>
+  <p:clrMapOvr>
+    <a:masterClrMapping/>
+  </p:clrMapOvr>
+</p:notes>
+</file>
+
+<file path=ppt/notesSlides/notesSlide5.xml><?xml version="1.0" encoding="utf-8"?>
+<p:notes xmlns:a="http://schemas.openxmlformats.org/drawingml/2006/main" xmlns:r="http://schemas.openxmlformats.org/officeDocument/2006/relationships" xmlns:p="http://schemas.openxmlformats.org/presentationml/2006/main">
+  <p:cSld>
+    <p:spTree>
+      <p:nvGrpSpPr>
+        <p:cNvPr id="1" name=""/>
+        <p:cNvGrpSpPr/>
+        <p:nvPr/>
+      </p:nvGrpSpPr>
+      <p:grpSpPr>
+        <a:xfrm>
+          <a:off x="0" y="0"/>
+          <a:ext cx="0" cy="0"/>
+          <a:chOff x="0" y="0"/>
+          <a:chExt cx="0" cy="0"/>
+        </a:xfrm>
+      </p:grpSpPr>
+      <p:sp>
+        <p:nvSpPr>
+          <p:cNvPr id="2" name="Slide Image Placeholder 1"/>
+          <p:cNvSpPr>
+            <a:spLocks noGrp="1" noRot="1" noChangeAspect="1"/>
+          </p:cNvSpPr>
+          <p:nvPr>
+            <p:ph type="sldImg"/>
+          </p:nvPr>
+        </p:nvSpPr>
+        <p:spPr/>
+      </p:sp>
+      <p:sp>
+        <p:nvSpPr>
+          <p:cNvPr id="3" name="Notes Placeholder 2"/>
+          <p:cNvSpPr>
+            <a:spLocks noGrp="1"/>
+          </p:cNvSpPr>
+          <p:nvPr>
+            <p:ph type="body" idx="1"/>
+          </p:nvPr>
+        </p:nvSpPr>
+        <p:spPr/>
+        <p:txBody>
+          <a:bodyPr/>
+          <a:lstStyle/>
+          <a:p>
+            <a:endParaRPr lang="en-US" dirty="0"/>
+          </a:p>
+        </p:txBody>
+      </p:sp>
+      <p:sp>
+        <p:nvSpPr>
+          <p:cNvPr id="4" name="Slide Number Placeholder 3"/>
+          <p:cNvSpPr>
+            <a:spLocks noGrp="1"/>
+          </p:cNvSpPr>
+          <p:nvPr>
+            <p:ph type="sldNum" sz="quarter" idx="10"/>
+          </p:nvPr>
+        </p:nvSpPr>
+        <p:spPr/>
+        <p:txBody>
+          <a:bodyPr/>
+          <a:lstStyle/>
+          <a:p>
+            <a:fld id="{13601C0D-AD39-8143-8175-88B781727A80}" type="slidenum">
+              <a:rPr lang="en-US" smtClean="0"/>
+              <a:t>15</a:t>
+            </a:fld>
+            <a:endParaRPr lang="en-US"/>
+          </a:p>
+        </p:txBody>
+      </p:sp>
+    </p:spTree>
+    <p:extLst>
+      <p:ext uri="{BB962C8B-B14F-4D97-AF65-F5344CB8AC3E}">
+        <p14:creationId xmlns:p14="http://schemas.microsoft.com/office/powerpoint/2010/main" val="4165162000"/>
+      </p:ext>
+    </p:extLst>
+  </p:cSld>
+  <p:clrMapOvr>
+    <a:masterClrMapping/>
+  </p:clrMapOvr>
+</p:notes>
+</file>
+
+<file path=ppt/notesSlides/notesSlide6.xml><?xml version="1.0" encoding="utf-8"?>
+<p:notes xmlns:a="http://schemas.openxmlformats.org/drawingml/2006/main" xmlns:r="http://schemas.openxmlformats.org/officeDocument/2006/relationships" xmlns:p="http://schemas.openxmlformats.org/presentationml/2006/main">
+  <p:cSld>
+    <p:spTree>
+      <p:nvGrpSpPr>
+        <p:cNvPr id="1" name=""/>
+        <p:cNvGrpSpPr/>
+        <p:nvPr/>
+      </p:nvGrpSpPr>
+      <p:grpSpPr>
+        <a:xfrm>
+          <a:off x="0" y="0"/>
+          <a:ext cx="0" cy="0"/>
+          <a:chOff x="0" y="0"/>
+          <a:chExt cx="0" cy="0"/>
+        </a:xfrm>
+      </p:grpSpPr>
+      <p:sp>
+        <p:nvSpPr>
+          <p:cNvPr id="2" name="Slide Image Placeholder 1"/>
+          <p:cNvSpPr>
+            <a:spLocks noGrp="1" noRot="1" noChangeAspect="1"/>
+          </p:cNvSpPr>
+          <p:nvPr>
+            <p:ph type="sldImg"/>
+          </p:nvPr>
+        </p:nvSpPr>
+        <p:spPr/>
+      </p:sp>
+      <p:sp>
+        <p:nvSpPr>
+          <p:cNvPr id="3" name="Notes Placeholder 2"/>
+          <p:cNvSpPr>
+            <a:spLocks noGrp="1"/>
+          </p:cNvSpPr>
+          <p:nvPr>
+            <p:ph type="body" idx="1"/>
+          </p:nvPr>
+        </p:nvSpPr>
+        <p:spPr/>
+        <p:txBody>
+          <a:bodyPr/>
+          <a:lstStyle/>
+          <a:p>
+            <a:endParaRPr lang="en-US" dirty="0"/>
+          </a:p>
+        </p:txBody>
+      </p:sp>
+      <p:sp>
+        <p:nvSpPr>
+          <p:cNvPr id="4" name="Slide Number Placeholder 3"/>
+          <p:cNvSpPr>
+            <a:spLocks noGrp="1"/>
+          </p:cNvSpPr>
+          <p:nvPr>
+            <p:ph type="sldNum" sz="quarter" idx="10"/>
+          </p:nvPr>
+        </p:nvSpPr>
+        <p:spPr/>
+        <p:txBody>
+          <a:bodyPr/>
+          <a:lstStyle/>
+          <a:p>
+            <a:fld id="{13601C0D-AD39-8143-8175-88B781727A80}" type="slidenum">
+              <a:rPr lang="en-US" smtClean="0"/>
+              <a:t>16</a:t>
+            </a:fld>
+            <a:endParaRPr lang="en-US"/>
+          </a:p>
+        </p:txBody>
+      </p:sp>
+    </p:spTree>
+    <p:extLst>
+      <p:ext uri="{BB962C8B-B14F-4D97-AF65-F5344CB8AC3E}">
+        <p14:creationId xmlns:p14="http://schemas.microsoft.com/office/powerpoint/2010/main" val="4165162000"/>
+      </p:ext>
+    </p:extLst>
+  </p:cSld>
+  <p:clrMapOvr>
+    <a:masterClrMapping/>
+  </p:clrMapOvr>
+</p:notes>
+</file>
+
+<file path=ppt/notesSlides/notesSlide7.xml><?xml version="1.0" encoding="utf-8"?>
+<p:notes xmlns:a="http://schemas.openxmlformats.org/drawingml/2006/main" xmlns:r="http://schemas.openxmlformats.org/officeDocument/2006/relationships" xmlns:p="http://schemas.openxmlformats.org/presentationml/2006/main">
+  <p:cSld>
+    <p:spTree>
+      <p:nvGrpSpPr>
+        <p:cNvPr id="1" name=""/>
+        <p:cNvGrpSpPr/>
+        <p:nvPr/>
+      </p:nvGrpSpPr>
+      <p:grpSpPr>
+        <a:xfrm>
+          <a:off x="0" y="0"/>
+          <a:ext cx="0" cy="0"/>
+          <a:chOff x="0" y="0"/>
+          <a:chExt cx="0" cy="0"/>
+        </a:xfrm>
+      </p:grpSpPr>
+      <p:sp>
+        <p:nvSpPr>
+          <p:cNvPr id="2" name="Slide Image Placeholder 1"/>
+          <p:cNvSpPr>
+            <a:spLocks noGrp="1" noRot="1" noChangeAspect="1"/>
+          </p:cNvSpPr>
+          <p:nvPr>
+            <p:ph type="sldImg"/>
+          </p:nvPr>
+        </p:nvSpPr>
+        <p:spPr/>
+      </p:sp>
+      <p:sp>
+        <p:nvSpPr>
+          <p:cNvPr id="3" name="Notes Placeholder 2"/>
+          <p:cNvSpPr>
+            <a:spLocks noGrp="1"/>
+          </p:cNvSpPr>
+          <p:nvPr>
+            <p:ph type="body" idx="1"/>
+          </p:nvPr>
+        </p:nvSpPr>
+        <p:spPr/>
+        <p:txBody>
+          <a:bodyPr/>
+          <a:lstStyle/>
+          <a:p>
+            <a:endParaRPr lang="en-US" dirty="0"/>
+          </a:p>
+        </p:txBody>
+      </p:sp>
+      <p:sp>
+        <p:nvSpPr>
+          <p:cNvPr id="4" name="Slide Number Placeholder 3"/>
+          <p:cNvSpPr>
+            <a:spLocks noGrp="1"/>
+          </p:cNvSpPr>
+          <p:nvPr>
+            <p:ph type="sldNum" sz="quarter" idx="10"/>
+          </p:nvPr>
+        </p:nvSpPr>
+        <p:spPr/>
+        <p:txBody>
+          <a:bodyPr/>
+          <a:lstStyle/>
+          <a:p>
+            <a:fld id="{13601C0D-AD39-8143-8175-88B781727A80}" type="slidenum">
+              <a:rPr lang="en-US" smtClean="0"/>
+              <a:t>17</a:t>
+            </a:fld>
+            <a:endParaRPr lang="en-US"/>
+          </a:p>
+        </p:txBody>
+      </p:sp>
+    </p:spTree>
+    <p:extLst>
+      <p:ext uri="{BB962C8B-B14F-4D97-AF65-F5344CB8AC3E}">
+        <p14:creationId xmlns:p14="http://schemas.microsoft.com/office/powerpoint/2010/main" val="4165162000"/>
+      </p:ext>
+    </p:extLst>
+  </p:cSld>
+  <p:clrMapOvr>
+    <a:masterClrMapping/>
+  </p:clrMapOvr>
+</p:notes>
+</file>
+
+<file path=ppt/notesSlides/notesSlide8.xml><?xml version="1.0" encoding="utf-8"?>
+<p:notes xmlns:a="http://schemas.openxmlformats.org/drawingml/2006/main" xmlns:r="http://schemas.openxmlformats.org/officeDocument/2006/relationships" xmlns:p="http://schemas.openxmlformats.org/presentationml/2006/main">
+  <p:cSld>
+    <p:spTree>
+      <p:nvGrpSpPr>
+        <p:cNvPr id="1" name=""/>
+        <p:cNvGrpSpPr/>
+        <p:nvPr/>
+      </p:nvGrpSpPr>
+      <p:grpSpPr>
+        <a:xfrm>
+          <a:off x="0" y="0"/>
+          <a:ext cx="0" cy="0"/>
+          <a:chOff x="0" y="0"/>
+          <a:chExt cx="0" cy="0"/>
+        </a:xfrm>
+      </p:grpSpPr>
+      <p:sp>
+        <p:nvSpPr>
+          <p:cNvPr id="2" name="Slide Image Placeholder 1"/>
+          <p:cNvSpPr>
+            <a:spLocks noGrp="1" noRot="1" noChangeAspect="1"/>
+          </p:cNvSpPr>
+          <p:nvPr>
+            <p:ph type="sldImg"/>
+          </p:nvPr>
+        </p:nvSpPr>
+        <p:spPr/>
+      </p:sp>
+      <p:sp>
+        <p:nvSpPr>
+          <p:cNvPr id="3" name="Notes Placeholder 2"/>
+          <p:cNvSpPr>
+            <a:spLocks noGrp="1"/>
+          </p:cNvSpPr>
+          <p:nvPr>
+            <p:ph type="body" idx="1"/>
+          </p:nvPr>
+        </p:nvSpPr>
+        <p:spPr/>
+        <p:txBody>
+          <a:bodyPr/>
+          <a:lstStyle/>
+          <a:p>
+            <a:endParaRPr lang="en-US" dirty="0"/>
+          </a:p>
+        </p:txBody>
+      </p:sp>
+      <p:sp>
+        <p:nvSpPr>
+          <p:cNvPr id="4" name="Slide Number Placeholder 3"/>
+          <p:cNvSpPr>
+            <a:spLocks noGrp="1"/>
+          </p:cNvSpPr>
+          <p:nvPr>
+            <p:ph type="sldNum" sz="quarter" idx="10"/>
+          </p:nvPr>
+        </p:nvSpPr>
+        <p:spPr/>
+        <p:txBody>
+          <a:bodyPr/>
+          <a:lstStyle/>
+          <a:p>
+            <a:fld id="{13601C0D-AD39-8143-8175-88B781727A80}" type="slidenum">
+              <a:rPr lang="en-US" smtClean="0"/>
+              <a:t>18</a:t>
             </a:fld>
             <a:endParaRPr lang="en-US"/>
           </a:p>
@@ -4381,7 +4806,7 @@
           <a:graphicData uri="http://schemas.openxmlformats.org/presentationml/2006/ole">
             <mc:AlternateContent xmlns:mc="http://schemas.openxmlformats.org/markup-compatibility/2006">
               <mc:Choice xmlns:v="urn:schemas-microsoft-com:vml" Requires="v">
-                <p:oleObj spid="_x0000_s1029" name="Document" r:id="rId3" imgW="5486400" imgH="838200" progId="Word.Document.12">
+                <p:oleObj spid="_x0000_s1030" name="Document" r:id="rId3" imgW="5486400" imgH="838200" progId="Word.Document.12">
                   <p:link updateAutomatic="1"/>
                 </p:oleObj>
               </mc:Choice>
@@ -4629,7 +5054,7 @@
         </p:spPr>
         <p:txBody>
           <a:bodyPr>
-            <a:normAutofit fontScale="85000" lnSpcReduction="20000"/>
+            <a:normAutofit fontScale="70000" lnSpcReduction="20000"/>
           </a:bodyPr>
           <a:lstStyle/>
           <a:p>
@@ -4656,6 +5081,12 @@
             <a:r>
               <a:rPr lang="en-US" dirty="0" smtClean="0"/>
               <a:t>New solution is created from these common items, then fittest remaining items are added until capacity is reached.</a:t>
+            </a:r>
+          </a:p>
+          <a:p>
+            <a:r>
+              <a:rPr lang="en-US" dirty="0" smtClean="0"/>
+              <a:t>In our experiments, the new solution was never better than the best crowd member. Often the same solution was discovered, or a less optimal solution.</a:t>
             </a:r>
             <a:endParaRPr lang="en-US" dirty="0"/>
           </a:p>
@@ -4695,6 +5126,771 @@
     <p:extLst>
       <p:ext uri="{BB962C8B-B14F-4D97-AF65-F5344CB8AC3E}">
         <p14:creationId xmlns:p14="http://schemas.microsoft.com/office/powerpoint/2010/main" val="3862024793"/>
+      </p:ext>
+    </p:extLst>
+  </p:cSld>
+  <p:clrMapOvr>
+    <a:masterClrMapping/>
+  </p:clrMapOvr>
+</p:sld>
+</file>
+
+<file path=ppt/slides/slide14.xml><?xml version="1.0" encoding="utf-8"?>
+<p:sld xmlns:a="http://schemas.openxmlformats.org/drawingml/2006/main" xmlns:r="http://schemas.openxmlformats.org/officeDocument/2006/relationships" xmlns:p="http://schemas.openxmlformats.org/presentationml/2006/main">
+  <p:cSld>
+    <p:spTree>
+      <p:nvGrpSpPr>
+        <p:cNvPr id="1" name=""/>
+        <p:cNvGrpSpPr/>
+        <p:nvPr/>
+      </p:nvGrpSpPr>
+      <p:grpSpPr>
+        <a:xfrm>
+          <a:off x="0" y="0"/>
+          <a:ext cx="0" cy="0"/>
+          <a:chOff x="0" y="0"/>
+          <a:chExt cx="0" cy="0"/>
+        </a:xfrm>
+      </p:grpSpPr>
+      <p:sp>
+        <p:nvSpPr>
+          <p:cNvPr id="2" name="Title 1"/>
+          <p:cNvSpPr>
+            <a:spLocks noGrp="1"/>
+          </p:cNvSpPr>
+          <p:nvPr>
+            <p:ph type="title"/>
+          </p:nvPr>
+        </p:nvSpPr>
+        <p:spPr/>
+        <p:txBody>
+          <a:bodyPr>
+            <a:normAutofit/>
+          </a:bodyPr>
+          <a:lstStyle/>
+          <a:p>
+            <a:r>
+              <a:rPr lang="en-US" dirty="0" smtClean="0"/>
+              <a:t>Results (</a:t>
+            </a:r>
+            <a:r>
+              <a:rPr lang="en-US" dirty="0"/>
+              <a:t>n</a:t>
+            </a:r>
+            <a:r>
+              <a:rPr lang="en-US" dirty="0" smtClean="0"/>
+              <a:t>=100</a:t>
+            </a:r>
+            <a:r>
+              <a:rPr lang="en-US" dirty="0"/>
+              <a:t>, c</a:t>
+            </a:r>
+            <a:r>
+              <a:rPr lang="en-US" dirty="0" smtClean="0"/>
+              <a:t>=300</a:t>
+            </a:r>
+            <a:r>
+              <a:rPr lang="en-US" dirty="0"/>
+              <a:t>)</a:t>
+            </a:r>
+            <a:endParaRPr lang="en-US" dirty="0"/>
+          </a:p>
+        </p:txBody>
+      </p:sp>
+      <p:sp>
+        <p:nvSpPr>
+          <p:cNvPr id="3" name="Content Placeholder 2"/>
+          <p:cNvSpPr>
+            <a:spLocks noGrp="1"/>
+          </p:cNvSpPr>
+          <p:nvPr>
+            <p:ph idx="1"/>
+          </p:nvPr>
+        </p:nvSpPr>
+        <p:spPr>
+          <a:xfrm>
+            <a:off x="381000" y="5943600"/>
+            <a:ext cx="8458200" cy="762000"/>
+          </a:xfrm>
+        </p:spPr>
+        <p:txBody>
+          <a:bodyPr>
+            <a:normAutofit fontScale="55000" lnSpcReduction="20000"/>
+          </a:bodyPr>
+          <a:lstStyle/>
+          <a:p>
+            <a:pPr marL="0" indent="0">
+              <a:buNone/>
+            </a:pPr>
+            <a:r>
+              <a:rPr lang="en-US" dirty="0" smtClean="0"/>
+              <a:t>Solution evolution over 70 </a:t>
+            </a:r>
+            <a:r>
+              <a:rPr lang="en-US" dirty="0"/>
+              <a:t>generations for n = 100, c = </a:t>
+            </a:r>
+            <a:r>
+              <a:rPr lang="en-US" dirty="0" smtClean="0"/>
+              <a:t>300. Population size = 60. Crowd size = 25.</a:t>
+            </a:r>
+            <a:r>
+              <a:rPr lang="en-US" dirty="0"/>
+              <a:t> </a:t>
+            </a:r>
+            <a:r>
+              <a:rPr lang="en-US" dirty="0" smtClean="0"/>
+              <a:t>Each color line is a different crowd member. Runtime: </a:t>
+            </a:r>
+            <a:r>
+              <a:rPr lang="en-US" dirty="0" smtClean="0"/>
+              <a:t>15.34 sec</a:t>
+            </a:r>
+          </a:p>
+        </p:txBody>
+      </p:sp>
+      <p:pic>
+        <p:nvPicPr>
+          <p:cNvPr id="5" name="Picture 4" descr="ga_performance_n100.png"/>
+          <p:cNvPicPr>
+            <a:picLocks noChangeAspect="1"/>
+          </p:cNvPicPr>
+          <p:nvPr/>
+        </p:nvPicPr>
+        <p:blipFill>
+          <a:blip r:embed="rId3">
+            <a:extLst>
+              <a:ext uri="{28A0092B-C50C-407E-A947-70E740481C1C}">
+                <a14:useLocalDpi xmlns:a14="http://schemas.microsoft.com/office/drawing/2010/main" val="0"/>
+              </a:ext>
+            </a:extLst>
+          </a:blip>
+          <a:stretch>
+            <a:fillRect/>
+          </a:stretch>
+        </p:blipFill>
+        <p:spPr>
+          <a:xfrm>
+            <a:off x="457200" y="1106559"/>
+            <a:ext cx="7997964" cy="4760841"/>
+          </a:xfrm>
+          <a:prstGeom prst="rect">
+            <a:avLst/>
+          </a:prstGeom>
+        </p:spPr>
+      </p:pic>
+    </p:spTree>
+    <p:extLst>
+      <p:ext uri="{BB962C8B-B14F-4D97-AF65-F5344CB8AC3E}">
+        <p14:creationId xmlns:p14="http://schemas.microsoft.com/office/powerpoint/2010/main" val="2342771597"/>
+      </p:ext>
+    </p:extLst>
+  </p:cSld>
+  <p:clrMapOvr>
+    <a:masterClrMapping/>
+  </p:clrMapOvr>
+</p:sld>
+</file>
+
+<file path=ppt/slides/slide15.xml><?xml version="1.0" encoding="utf-8"?>
+<p:sld xmlns:a="http://schemas.openxmlformats.org/drawingml/2006/main" xmlns:r="http://schemas.openxmlformats.org/officeDocument/2006/relationships" xmlns:p="http://schemas.openxmlformats.org/presentationml/2006/main">
+  <p:cSld>
+    <p:spTree>
+      <p:nvGrpSpPr>
+        <p:cNvPr id="1" name=""/>
+        <p:cNvGrpSpPr/>
+        <p:nvPr/>
+      </p:nvGrpSpPr>
+      <p:grpSpPr>
+        <a:xfrm>
+          <a:off x="0" y="0"/>
+          <a:ext cx="0" cy="0"/>
+          <a:chOff x="0" y="0"/>
+          <a:chExt cx="0" cy="0"/>
+        </a:xfrm>
+      </p:grpSpPr>
+      <p:sp>
+        <p:nvSpPr>
+          <p:cNvPr id="2" name="Title 1"/>
+          <p:cNvSpPr>
+            <a:spLocks noGrp="1"/>
+          </p:cNvSpPr>
+          <p:nvPr>
+            <p:ph type="title"/>
+          </p:nvPr>
+        </p:nvSpPr>
+        <p:spPr/>
+        <p:txBody>
+          <a:bodyPr>
+            <a:normAutofit/>
+          </a:bodyPr>
+          <a:lstStyle/>
+          <a:p>
+            <a:r>
+              <a:rPr lang="en-US" dirty="0" smtClean="0"/>
+              <a:t>Results (n=300, c=600)</a:t>
+            </a:r>
+            <a:endParaRPr lang="en-US" dirty="0"/>
+          </a:p>
+        </p:txBody>
+      </p:sp>
+      <p:sp>
+        <p:nvSpPr>
+          <p:cNvPr id="3" name="Content Placeholder 2"/>
+          <p:cNvSpPr>
+            <a:spLocks noGrp="1"/>
+          </p:cNvSpPr>
+          <p:nvPr>
+            <p:ph idx="1"/>
+          </p:nvPr>
+        </p:nvSpPr>
+        <p:spPr>
+          <a:xfrm>
+            <a:off x="381000" y="5943600"/>
+            <a:ext cx="8458200" cy="762000"/>
+          </a:xfrm>
+        </p:spPr>
+        <p:txBody>
+          <a:bodyPr>
+            <a:normAutofit fontScale="70000" lnSpcReduction="20000"/>
+          </a:bodyPr>
+          <a:lstStyle/>
+          <a:p>
+            <a:pPr marL="0" indent="0">
+              <a:buNone/>
+            </a:pPr>
+            <a:r>
+              <a:rPr lang="en-US" dirty="0" smtClean="0"/>
+              <a:t>Solution evolution over 70 </a:t>
+            </a:r>
+            <a:r>
+              <a:rPr lang="en-US" dirty="0"/>
+              <a:t>generations for n = </a:t>
+            </a:r>
+            <a:r>
+              <a:rPr lang="en-US" dirty="0" smtClean="0"/>
+              <a:t>300</a:t>
+            </a:r>
+            <a:r>
+              <a:rPr lang="en-US" dirty="0"/>
+              <a:t>, c = </a:t>
+            </a:r>
+            <a:r>
+              <a:rPr lang="en-US" dirty="0" smtClean="0"/>
+              <a:t>600. Population size = 60. Crowd size = 25.</a:t>
+            </a:r>
+            <a:r>
+              <a:rPr lang="en-US" dirty="0"/>
+              <a:t> </a:t>
+            </a:r>
+            <a:r>
+              <a:rPr lang="en-US" dirty="0" smtClean="0"/>
+              <a:t>Runtime: </a:t>
+            </a:r>
+            <a:r>
+              <a:rPr lang="en-US" dirty="0" smtClean="0"/>
+              <a:t>90.55 sec</a:t>
+            </a:r>
+          </a:p>
+        </p:txBody>
+      </p:sp>
+      <p:pic>
+        <p:nvPicPr>
+          <p:cNvPr id="4" name="Picture 3" descr="ga_performance_n300.png"/>
+          <p:cNvPicPr>
+            <a:picLocks noChangeAspect="1"/>
+          </p:cNvPicPr>
+          <p:nvPr/>
+        </p:nvPicPr>
+        <p:blipFill>
+          <a:blip r:embed="rId3">
+            <a:extLst>
+              <a:ext uri="{28A0092B-C50C-407E-A947-70E740481C1C}">
+                <a14:useLocalDpi xmlns:a14="http://schemas.microsoft.com/office/drawing/2010/main" val="0"/>
+              </a:ext>
+            </a:extLst>
+          </a:blip>
+          <a:stretch>
+            <a:fillRect/>
+          </a:stretch>
+        </p:blipFill>
+        <p:spPr>
+          <a:xfrm>
+            <a:off x="1219200" y="1143000"/>
+            <a:ext cx="6309409" cy="4764878"/>
+          </a:xfrm>
+          <a:prstGeom prst="rect">
+            <a:avLst/>
+          </a:prstGeom>
+        </p:spPr>
+      </p:pic>
+    </p:spTree>
+    <p:extLst>
+      <p:ext uri="{BB962C8B-B14F-4D97-AF65-F5344CB8AC3E}">
+        <p14:creationId xmlns:p14="http://schemas.microsoft.com/office/powerpoint/2010/main" val="3645026756"/>
+      </p:ext>
+    </p:extLst>
+  </p:cSld>
+  <p:clrMapOvr>
+    <a:masterClrMapping/>
+  </p:clrMapOvr>
+</p:sld>
+</file>
+
+<file path=ppt/slides/slide16.xml><?xml version="1.0" encoding="utf-8"?>
+<p:sld xmlns:a="http://schemas.openxmlformats.org/drawingml/2006/main" xmlns:r="http://schemas.openxmlformats.org/officeDocument/2006/relationships" xmlns:p="http://schemas.openxmlformats.org/presentationml/2006/main">
+  <p:cSld>
+    <p:spTree>
+      <p:nvGrpSpPr>
+        <p:cNvPr id="1" name=""/>
+        <p:cNvGrpSpPr/>
+        <p:nvPr/>
+      </p:nvGrpSpPr>
+      <p:grpSpPr>
+        <a:xfrm>
+          <a:off x="0" y="0"/>
+          <a:ext cx="0" cy="0"/>
+          <a:chOff x="0" y="0"/>
+          <a:chExt cx="0" cy="0"/>
+        </a:xfrm>
+      </p:grpSpPr>
+      <p:sp>
+        <p:nvSpPr>
+          <p:cNvPr id="2" name="Title 1"/>
+          <p:cNvSpPr>
+            <a:spLocks noGrp="1"/>
+          </p:cNvSpPr>
+          <p:nvPr>
+            <p:ph type="title"/>
+          </p:nvPr>
+        </p:nvSpPr>
+        <p:spPr/>
+        <p:txBody>
+          <a:bodyPr>
+            <a:normAutofit/>
+          </a:bodyPr>
+          <a:lstStyle/>
+          <a:p>
+            <a:r>
+              <a:rPr lang="en-US" dirty="0" smtClean="0"/>
+              <a:t>Results (n=600, c=1200)</a:t>
+            </a:r>
+            <a:endParaRPr lang="en-US" dirty="0"/>
+          </a:p>
+        </p:txBody>
+      </p:sp>
+      <p:sp>
+        <p:nvSpPr>
+          <p:cNvPr id="3" name="Content Placeholder 2"/>
+          <p:cNvSpPr>
+            <a:spLocks noGrp="1"/>
+          </p:cNvSpPr>
+          <p:nvPr>
+            <p:ph idx="1"/>
+          </p:nvPr>
+        </p:nvSpPr>
+        <p:spPr>
+          <a:xfrm>
+            <a:off x="381000" y="5943600"/>
+            <a:ext cx="8458200" cy="762000"/>
+          </a:xfrm>
+        </p:spPr>
+        <p:txBody>
+          <a:bodyPr>
+            <a:normAutofit fontScale="70000" lnSpcReduction="20000"/>
+          </a:bodyPr>
+          <a:lstStyle/>
+          <a:p>
+            <a:pPr marL="0" indent="0">
+              <a:buNone/>
+            </a:pPr>
+            <a:r>
+              <a:rPr lang="en-US" dirty="0" smtClean="0"/>
+              <a:t>Solution evolution over 70 </a:t>
+            </a:r>
+            <a:r>
+              <a:rPr lang="en-US" dirty="0"/>
+              <a:t>generations for n = </a:t>
+            </a:r>
+            <a:r>
+              <a:rPr lang="en-US" dirty="0" smtClean="0"/>
+              <a:t>600</a:t>
+            </a:r>
+            <a:r>
+              <a:rPr lang="en-US" dirty="0"/>
+              <a:t>, c = </a:t>
+            </a:r>
+            <a:r>
+              <a:rPr lang="en-US" dirty="0" smtClean="0"/>
+              <a:t>1200. Population size = 60. Crowd size = 25.</a:t>
+            </a:r>
+            <a:r>
+              <a:rPr lang="en-US" dirty="0"/>
+              <a:t> </a:t>
+            </a:r>
+            <a:r>
+              <a:rPr lang="en-US" dirty="0" smtClean="0"/>
+              <a:t>Runtime: 316.61 </a:t>
+            </a:r>
+            <a:r>
+              <a:rPr lang="en-US" dirty="0" smtClean="0"/>
+              <a:t>sec</a:t>
+            </a:r>
+          </a:p>
+        </p:txBody>
+      </p:sp>
+      <p:pic>
+        <p:nvPicPr>
+          <p:cNvPr id="5" name="Picture 4" descr="ga_performance_n600.png"/>
+          <p:cNvPicPr>
+            <a:picLocks noChangeAspect="1"/>
+          </p:cNvPicPr>
+          <p:nvPr/>
+        </p:nvPicPr>
+        <p:blipFill>
+          <a:blip r:embed="rId3">
+            <a:extLst>
+              <a:ext uri="{28A0092B-C50C-407E-A947-70E740481C1C}">
+                <a14:useLocalDpi xmlns:a14="http://schemas.microsoft.com/office/drawing/2010/main" val="0"/>
+              </a:ext>
+            </a:extLst>
+          </a:blip>
+          <a:stretch>
+            <a:fillRect/>
+          </a:stretch>
+        </p:blipFill>
+        <p:spPr>
+          <a:xfrm>
+            <a:off x="1219200" y="1143000"/>
+            <a:ext cx="6255810" cy="4724400"/>
+          </a:xfrm>
+          <a:prstGeom prst="rect">
+            <a:avLst/>
+          </a:prstGeom>
+        </p:spPr>
+      </p:pic>
+    </p:spTree>
+    <p:extLst>
+      <p:ext uri="{BB962C8B-B14F-4D97-AF65-F5344CB8AC3E}">
+        <p14:creationId xmlns:p14="http://schemas.microsoft.com/office/powerpoint/2010/main" val="1775093048"/>
+      </p:ext>
+    </p:extLst>
+  </p:cSld>
+  <p:clrMapOvr>
+    <a:masterClrMapping/>
+  </p:clrMapOvr>
+</p:sld>
+</file>
+
+<file path=ppt/slides/slide17.xml><?xml version="1.0" encoding="utf-8"?>
+<p:sld xmlns:a="http://schemas.openxmlformats.org/drawingml/2006/main" xmlns:r="http://schemas.openxmlformats.org/officeDocument/2006/relationships" xmlns:p="http://schemas.openxmlformats.org/presentationml/2006/main">
+  <p:cSld>
+    <p:spTree>
+      <p:nvGrpSpPr>
+        <p:cNvPr id="1" name=""/>
+        <p:cNvGrpSpPr/>
+        <p:nvPr/>
+      </p:nvGrpSpPr>
+      <p:grpSpPr>
+        <a:xfrm>
+          <a:off x="0" y="0"/>
+          <a:ext cx="0" cy="0"/>
+          <a:chOff x="0" y="0"/>
+          <a:chExt cx="0" cy="0"/>
+        </a:xfrm>
+      </p:grpSpPr>
+      <p:sp>
+        <p:nvSpPr>
+          <p:cNvPr id="2" name="Title 1"/>
+          <p:cNvSpPr>
+            <a:spLocks noGrp="1"/>
+          </p:cNvSpPr>
+          <p:nvPr>
+            <p:ph type="title"/>
+          </p:nvPr>
+        </p:nvSpPr>
+        <p:spPr/>
+        <p:txBody>
+          <a:bodyPr>
+            <a:normAutofit/>
+          </a:bodyPr>
+          <a:lstStyle/>
+          <a:p>
+            <a:r>
+              <a:rPr lang="en-US" dirty="0" smtClean="0"/>
+              <a:t>Further Areas for Research</a:t>
+            </a:r>
+            <a:endParaRPr lang="en-US" dirty="0"/>
+          </a:p>
+        </p:txBody>
+      </p:sp>
+      <p:sp>
+        <p:nvSpPr>
+          <p:cNvPr id="4" name="Content Placeholder 3"/>
+          <p:cNvSpPr>
+            <a:spLocks noGrp="1"/>
+          </p:cNvSpPr>
+          <p:nvPr>
+            <p:ph idx="1"/>
+          </p:nvPr>
+        </p:nvSpPr>
+        <p:spPr/>
+        <p:txBody>
+          <a:bodyPr/>
+          <a:lstStyle/>
+          <a:p>
+            <a:r>
+              <a:rPr lang="en-US" dirty="0" smtClean="0"/>
+              <a:t>Adding weights to each objective</a:t>
+            </a:r>
+          </a:p>
+          <a:p>
+            <a:r>
+              <a:rPr lang="en-US" dirty="0" smtClean="0"/>
+              <a:t>Increasing number of objectives</a:t>
+            </a:r>
+          </a:p>
+          <a:p>
+            <a:r>
+              <a:rPr lang="en-US" dirty="0" smtClean="0"/>
+              <a:t>Evaluating alternate fitness measures</a:t>
+            </a:r>
+          </a:p>
+          <a:p>
+            <a:r>
+              <a:rPr lang="en-US" dirty="0" smtClean="0"/>
+              <a:t>Improve </a:t>
+            </a:r>
+            <a:r>
+              <a:rPr lang="en-US" dirty="0" err="1" smtClean="0"/>
+              <a:t>WoC</a:t>
+            </a:r>
+            <a:r>
+              <a:rPr lang="en-US" dirty="0" smtClean="0"/>
+              <a:t> generated solution</a:t>
+            </a:r>
+            <a:endParaRPr lang="en-US" dirty="0"/>
+          </a:p>
+        </p:txBody>
+      </p:sp>
+    </p:spTree>
+    <p:extLst>
+      <p:ext uri="{BB962C8B-B14F-4D97-AF65-F5344CB8AC3E}">
+        <p14:creationId xmlns:p14="http://schemas.microsoft.com/office/powerpoint/2010/main" val="2242088131"/>
+      </p:ext>
+    </p:extLst>
+  </p:cSld>
+  <p:clrMapOvr>
+    <a:masterClrMapping/>
+  </p:clrMapOvr>
+</p:sld>
+</file>
+
+<file path=ppt/slides/slide18.xml><?xml version="1.0" encoding="utf-8"?>
+<p:sld xmlns:a="http://schemas.openxmlformats.org/drawingml/2006/main" xmlns:r="http://schemas.openxmlformats.org/officeDocument/2006/relationships" xmlns:p="http://schemas.openxmlformats.org/presentationml/2006/main">
+  <p:cSld>
+    <p:spTree>
+      <p:nvGrpSpPr>
+        <p:cNvPr id="1" name=""/>
+        <p:cNvGrpSpPr/>
+        <p:nvPr/>
+      </p:nvGrpSpPr>
+      <p:grpSpPr>
+        <a:xfrm>
+          <a:off x="0" y="0"/>
+          <a:ext cx="0" cy="0"/>
+          <a:chOff x="0" y="0"/>
+          <a:chExt cx="0" cy="0"/>
+        </a:xfrm>
+      </p:grpSpPr>
+      <p:sp>
+        <p:nvSpPr>
+          <p:cNvPr id="2" name="Title 1"/>
+          <p:cNvSpPr>
+            <a:spLocks noGrp="1"/>
+          </p:cNvSpPr>
+          <p:nvPr>
+            <p:ph type="title"/>
+          </p:nvPr>
+        </p:nvSpPr>
+        <p:spPr/>
+        <p:txBody>
+          <a:bodyPr>
+            <a:normAutofit/>
+          </a:bodyPr>
+          <a:lstStyle/>
+          <a:p>
+            <a:r>
+              <a:rPr lang="en-US" dirty="0" smtClean="0"/>
+              <a:t>References</a:t>
+            </a:r>
+            <a:endParaRPr lang="en-US" dirty="0"/>
+          </a:p>
+        </p:txBody>
+      </p:sp>
+      <p:sp>
+        <p:nvSpPr>
+          <p:cNvPr id="4" name="Content Placeholder 3"/>
+          <p:cNvSpPr>
+            <a:spLocks noGrp="1"/>
+          </p:cNvSpPr>
+          <p:nvPr>
+            <p:ph idx="1"/>
+          </p:nvPr>
+        </p:nvSpPr>
+        <p:spPr/>
+        <p:txBody>
+          <a:bodyPr>
+            <a:normAutofit fontScale="70000" lnSpcReduction="20000"/>
+          </a:bodyPr>
+          <a:lstStyle/>
+          <a:p>
+            <a:pPr marL="0" indent="0">
+              <a:buNone/>
+            </a:pPr>
+            <a:r>
+              <a:rPr lang="en-US" dirty="0" smtClean="0"/>
+              <a:t>M</a:t>
+            </a:r>
+            <a:r>
+              <a:rPr lang="en-US" dirty="0"/>
+              <a:t>. </a:t>
+            </a:r>
+            <a:r>
+              <a:rPr lang="en-US" dirty="0" err="1"/>
+              <a:t>Hristakeva</a:t>
+            </a:r>
+            <a:r>
+              <a:rPr lang="en-US" dirty="0"/>
+              <a:t>, D. </a:t>
+            </a:r>
+            <a:r>
+              <a:rPr lang="en-US" dirty="0" err="1" smtClean="0"/>
+              <a:t>Shrestha.</a:t>
+            </a:r>
+            <a:r>
+              <a:rPr lang="en-US" u="sng" dirty="0" err="1" smtClean="0">
+                <a:hlinkClick r:id="rId3"/>
+              </a:rPr>
+              <a:t>Solving</a:t>
+            </a:r>
+            <a:r>
+              <a:rPr lang="en-US" u="sng" dirty="0" smtClean="0">
+                <a:hlinkClick r:id="rId3"/>
+              </a:rPr>
+              <a:t> </a:t>
+            </a:r>
+            <a:r>
+              <a:rPr lang="en-US" u="sng" dirty="0">
+                <a:hlinkClick r:id="rId3"/>
+              </a:rPr>
+              <a:t>the 0-1 knapsack problem with genetic algorithms</a:t>
+            </a:r>
+            <a:r>
+              <a:rPr lang="en-US" dirty="0"/>
+              <a:t>." </a:t>
+            </a:r>
+            <a:r>
+              <a:rPr lang="en-US" i="1" dirty="0"/>
+              <a:t>Midwest Instruction and Computing Symposium</a:t>
+            </a:r>
+            <a:r>
+              <a:rPr lang="en-US" dirty="0"/>
+              <a:t>. 2004.</a:t>
+            </a:r>
+          </a:p>
+          <a:p>
+            <a:pPr marL="0" indent="0">
+              <a:buNone/>
+            </a:pPr>
+            <a:r>
+              <a:rPr lang="en-US" dirty="0"/>
+              <a:t> </a:t>
+            </a:r>
+          </a:p>
+          <a:p>
+            <a:pPr marL="0" indent="0">
+              <a:buNone/>
+            </a:pPr>
+            <a:r>
+              <a:rPr lang="en-US" u="sng" dirty="0" smtClean="0">
+                <a:hlinkClick r:id="rId4" tooltip="Richard M. Karp"/>
+              </a:rPr>
+              <a:t>Richard </a:t>
+            </a:r>
+            <a:r>
+              <a:rPr lang="en-US" u="sng" dirty="0">
+                <a:hlinkClick r:id="rId4" tooltip="Richard M. Karp"/>
+              </a:rPr>
+              <a:t>M. Karp</a:t>
+            </a:r>
+            <a:r>
+              <a:rPr lang="en-US" dirty="0"/>
+              <a:t> (1972). </a:t>
+            </a:r>
+            <a:r>
+              <a:rPr lang="en-US" u="sng" dirty="0">
+                <a:hlinkClick r:id="rId5"/>
+              </a:rPr>
+              <a:t>"Reducibility Among Combinatorial Problems"</a:t>
+            </a:r>
+            <a:r>
+              <a:rPr lang="en-US" dirty="0"/>
+              <a:t>. In R. E. Miller and J. W. Thatcher (editors). </a:t>
+            </a:r>
+            <a:r>
+              <a:rPr lang="en-US" i="1" dirty="0"/>
+              <a:t>Complexity of Computer Computations</a:t>
+            </a:r>
+            <a:r>
+              <a:rPr lang="en-US" dirty="0"/>
+              <a:t>. New York: Plenum. pp. 85–103.</a:t>
+            </a:r>
+          </a:p>
+          <a:p>
+            <a:pPr marL="0" indent="0">
+              <a:buNone/>
+            </a:pPr>
+            <a:r>
+              <a:rPr lang="en-US" dirty="0"/>
+              <a:t> </a:t>
+            </a:r>
+          </a:p>
+          <a:p>
+            <a:pPr marL="0" indent="0">
+              <a:buNone/>
+            </a:pPr>
+            <a:r>
+              <a:rPr lang="en-US" u="sng" dirty="0" smtClean="0">
+                <a:hlinkClick r:id="rId6" tooltip="George Dantzig"/>
+              </a:rPr>
+              <a:t>George </a:t>
+            </a:r>
+            <a:r>
+              <a:rPr lang="en-US" u="sng" dirty="0">
+                <a:hlinkClick r:id="rId6" tooltip="George Dantzig"/>
+              </a:rPr>
+              <a:t>B. Dantzig</a:t>
+            </a:r>
+            <a:r>
+              <a:rPr lang="en-US" dirty="0"/>
+              <a:t>, Discrete-Variable </a:t>
+            </a:r>
+            <a:r>
+              <a:rPr lang="en-US" dirty="0" err="1"/>
+              <a:t>Extremum</a:t>
+            </a:r>
+            <a:r>
+              <a:rPr lang="en-US" dirty="0"/>
+              <a:t> Problems, Operations Research Vol. 5, No. 2, April 1957, pp. 266–288,</a:t>
+            </a:r>
+          </a:p>
+        </p:txBody>
+      </p:sp>
+    </p:spTree>
+    <p:extLst>
+      <p:ext uri="{BB962C8B-B14F-4D97-AF65-F5344CB8AC3E}">
+        <p14:creationId xmlns:p14="http://schemas.microsoft.com/office/powerpoint/2010/main" val="1069932616"/>
       </p:ext>
     </p:extLst>
   </p:cSld>

</xml_diff>

<commit_message>
added obligatory "questions?" slide
</commit_message>
<xml_diff>
--- a/docs/knapsack_presentation.pptx
+++ b/docs/knapsack_presentation.pptx
@@ -5,7 +5,7 @@
     <p:sldMasterId id="2147483648" r:id="rId1"/>
   </p:sldMasterIdLst>
   <p:notesMasterIdLst>
-    <p:notesMasterId r:id="rId20"/>
+    <p:notesMasterId r:id="rId21"/>
   </p:notesMasterIdLst>
   <p:sldIdLst>
     <p:sldId id="256" r:id="rId2"/>
@@ -26,6 +26,7 @@
     <p:sldId id="272" r:id="rId17"/>
     <p:sldId id="273" r:id="rId18"/>
     <p:sldId id="274" r:id="rId19"/>
+    <p:sldId id="275" r:id="rId20"/>
   </p:sldIdLst>
   <p:sldSz cx="9144000" cy="6858000" type="screen4x3"/>
   <p:notesSz cx="6858000" cy="9144000"/>
@@ -209,7 +210,7 @@
           <a:p>
             <a:fld id="{DFA55D5A-9713-F741-A396-5C05593D88B1}" type="datetimeFigureOut">
               <a:rPr lang="en-US" smtClean="0"/>
-              <a:t>11/18/14</a:t>
+              <a:t>11/18/2014</a:t>
             </a:fld>
             <a:endParaRPr lang="en-US"/>
           </a:p>
@@ -521,7 +522,7 @@
           <a:bodyPr/>
           <a:lstStyle/>
           <a:p>
-            <a:endParaRPr lang="en-US" dirty="0"/>
+            <a:endParaRPr lang="en-US"/>
           </a:p>
         </p:txBody>
       </p:sp>
@@ -552,6 +553,258 @@
     <p:extLst>
       <p:ext uri="{BB962C8B-B14F-4D97-AF65-F5344CB8AC3E}">
         <p14:creationId xmlns:p14="http://schemas.microsoft.com/office/powerpoint/2010/main" val="810787870"/>
+      </p:ext>
+    </p:extLst>
+  </p:cSld>
+  <p:clrMapOvr>
+    <a:masterClrMapping/>
+  </p:clrMapOvr>
+</p:notes>
+</file>
+
+<file path=ppt/notesSlides/notesSlide10.xml><?xml version="1.0" encoding="utf-8"?>
+<p:notes xmlns:a="http://schemas.openxmlformats.org/drawingml/2006/main" xmlns:r="http://schemas.openxmlformats.org/officeDocument/2006/relationships" xmlns:p="http://schemas.openxmlformats.org/presentationml/2006/main">
+  <p:cSld>
+    <p:spTree>
+      <p:nvGrpSpPr>
+        <p:cNvPr id="1" name=""/>
+        <p:cNvGrpSpPr/>
+        <p:nvPr/>
+      </p:nvGrpSpPr>
+      <p:grpSpPr>
+        <a:xfrm>
+          <a:off x="0" y="0"/>
+          <a:ext cx="0" cy="0"/>
+          <a:chOff x="0" y="0"/>
+          <a:chExt cx="0" cy="0"/>
+        </a:xfrm>
+      </p:grpSpPr>
+      <p:sp>
+        <p:nvSpPr>
+          <p:cNvPr id="2" name="Slide Image Placeholder 1"/>
+          <p:cNvSpPr>
+            <a:spLocks noGrp="1" noRot="1" noChangeAspect="1"/>
+          </p:cNvSpPr>
+          <p:nvPr>
+            <p:ph type="sldImg"/>
+          </p:nvPr>
+        </p:nvSpPr>
+        <p:spPr/>
+      </p:sp>
+      <p:sp>
+        <p:nvSpPr>
+          <p:cNvPr id="3" name="Notes Placeholder 2"/>
+          <p:cNvSpPr>
+            <a:spLocks noGrp="1"/>
+          </p:cNvSpPr>
+          <p:nvPr>
+            <p:ph type="body" idx="1"/>
+          </p:nvPr>
+        </p:nvSpPr>
+        <p:spPr/>
+        <p:txBody>
+          <a:bodyPr/>
+          <a:lstStyle/>
+          <a:p>
+            <a:endParaRPr lang="en-US"/>
+          </a:p>
+        </p:txBody>
+      </p:sp>
+      <p:sp>
+        <p:nvSpPr>
+          <p:cNvPr id="4" name="Slide Number Placeholder 3"/>
+          <p:cNvSpPr>
+            <a:spLocks noGrp="1"/>
+          </p:cNvSpPr>
+          <p:nvPr>
+            <p:ph type="sldNum" sz="quarter" idx="10"/>
+          </p:nvPr>
+        </p:nvSpPr>
+        <p:spPr/>
+        <p:txBody>
+          <a:bodyPr/>
+          <a:lstStyle/>
+          <a:p>
+            <a:fld id="{13601C0D-AD39-8143-8175-88B781727A80}" type="slidenum">
+              <a:rPr lang="en-US" smtClean="0"/>
+              <a:t>16</a:t>
+            </a:fld>
+            <a:endParaRPr lang="en-US"/>
+          </a:p>
+        </p:txBody>
+      </p:sp>
+    </p:spTree>
+    <p:extLst>
+      <p:ext uri="{BB962C8B-B14F-4D97-AF65-F5344CB8AC3E}">
+        <p14:creationId xmlns:p14="http://schemas.microsoft.com/office/powerpoint/2010/main" val="4165162000"/>
+      </p:ext>
+    </p:extLst>
+  </p:cSld>
+  <p:clrMapOvr>
+    <a:masterClrMapping/>
+  </p:clrMapOvr>
+</p:notes>
+</file>
+
+<file path=ppt/notesSlides/notesSlide11.xml><?xml version="1.0" encoding="utf-8"?>
+<p:notes xmlns:a="http://schemas.openxmlformats.org/drawingml/2006/main" xmlns:r="http://schemas.openxmlformats.org/officeDocument/2006/relationships" xmlns:p="http://schemas.openxmlformats.org/presentationml/2006/main">
+  <p:cSld>
+    <p:spTree>
+      <p:nvGrpSpPr>
+        <p:cNvPr id="1" name=""/>
+        <p:cNvGrpSpPr/>
+        <p:nvPr/>
+      </p:nvGrpSpPr>
+      <p:grpSpPr>
+        <a:xfrm>
+          <a:off x="0" y="0"/>
+          <a:ext cx="0" cy="0"/>
+          <a:chOff x="0" y="0"/>
+          <a:chExt cx="0" cy="0"/>
+        </a:xfrm>
+      </p:grpSpPr>
+      <p:sp>
+        <p:nvSpPr>
+          <p:cNvPr id="2" name="Slide Image Placeholder 1"/>
+          <p:cNvSpPr>
+            <a:spLocks noGrp="1" noRot="1" noChangeAspect="1"/>
+          </p:cNvSpPr>
+          <p:nvPr>
+            <p:ph type="sldImg"/>
+          </p:nvPr>
+        </p:nvSpPr>
+        <p:spPr/>
+      </p:sp>
+      <p:sp>
+        <p:nvSpPr>
+          <p:cNvPr id="3" name="Notes Placeholder 2"/>
+          <p:cNvSpPr>
+            <a:spLocks noGrp="1"/>
+          </p:cNvSpPr>
+          <p:nvPr>
+            <p:ph type="body" idx="1"/>
+          </p:nvPr>
+        </p:nvSpPr>
+        <p:spPr/>
+        <p:txBody>
+          <a:bodyPr/>
+          <a:lstStyle/>
+          <a:p>
+            <a:endParaRPr lang="en-US"/>
+          </a:p>
+        </p:txBody>
+      </p:sp>
+      <p:sp>
+        <p:nvSpPr>
+          <p:cNvPr id="4" name="Slide Number Placeholder 3"/>
+          <p:cNvSpPr>
+            <a:spLocks noGrp="1"/>
+          </p:cNvSpPr>
+          <p:nvPr>
+            <p:ph type="sldNum" sz="quarter" idx="10"/>
+          </p:nvPr>
+        </p:nvSpPr>
+        <p:spPr/>
+        <p:txBody>
+          <a:bodyPr/>
+          <a:lstStyle/>
+          <a:p>
+            <a:fld id="{13601C0D-AD39-8143-8175-88B781727A80}" type="slidenum">
+              <a:rPr lang="en-US" smtClean="0"/>
+              <a:t>17</a:t>
+            </a:fld>
+            <a:endParaRPr lang="en-US"/>
+          </a:p>
+        </p:txBody>
+      </p:sp>
+    </p:spTree>
+    <p:extLst>
+      <p:ext uri="{BB962C8B-B14F-4D97-AF65-F5344CB8AC3E}">
+        <p14:creationId xmlns:p14="http://schemas.microsoft.com/office/powerpoint/2010/main" val="4165162000"/>
+      </p:ext>
+    </p:extLst>
+  </p:cSld>
+  <p:clrMapOvr>
+    <a:masterClrMapping/>
+  </p:clrMapOvr>
+</p:notes>
+</file>
+
+<file path=ppt/notesSlides/notesSlide12.xml><?xml version="1.0" encoding="utf-8"?>
+<p:notes xmlns:a="http://schemas.openxmlformats.org/drawingml/2006/main" xmlns:r="http://schemas.openxmlformats.org/officeDocument/2006/relationships" xmlns:p="http://schemas.openxmlformats.org/presentationml/2006/main">
+  <p:cSld>
+    <p:spTree>
+      <p:nvGrpSpPr>
+        <p:cNvPr id="1" name=""/>
+        <p:cNvGrpSpPr/>
+        <p:nvPr/>
+      </p:nvGrpSpPr>
+      <p:grpSpPr>
+        <a:xfrm>
+          <a:off x="0" y="0"/>
+          <a:ext cx="0" cy="0"/>
+          <a:chOff x="0" y="0"/>
+          <a:chExt cx="0" cy="0"/>
+        </a:xfrm>
+      </p:grpSpPr>
+      <p:sp>
+        <p:nvSpPr>
+          <p:cNvPr id="2" name="Slide Image Placeholder 1"/>
+          <p:cNvSpPr>
+            <a:spLocks noGrp="1" noRot="1" noChangeAspect="1"/>
+          </p:cNvSpPr>
+          <p:nvPr>
+            <p:ph type="sldImg"/>
+          </p:nvPr>
+        </p:nvSpPr>
+        <p:spPr/>
+      </p:sp>
+      <p:sp>
+        <p:nvSpPr>
+          <p:cNvPr id="3" name="Notes Placeholder 2"/>
+          <p:cNvSpPr>
+            <a:spLocks noGrp="1"/>
+          </p:cNvSpPr>
+          <p:nvPr>
+            <p:ph type="body" idx="1"/>
+          </p:nvPr>
+        </p:nvSpPr>
+        <p:spPr/>
+        <p:txBody>
+          <a:bodyPr/>
+          <a:lstStyle/>
+          <a:p>
+            <a:endParaRPr lang="en-US"/>
+          </a:p>
+        </p:txBody>
+      </p:sp>
+      <p:sp>
+        <p:nvSpPr>
+          <p:cNvPr id="4" name="Slide Number Placeholder 3"/>
+          <p:cNvSpPr>
+            <a:spLocks noGrp="1"/>
+          </p:cNvSpPr>
+          <p:nvPr>
+            <p:ph type="sldNum" sz="quarter" idx="10"/>
+          </p:nvPr>
+        </p:nvSpPr>
+        <p:spPr/>
+        <p:txBody>
+          <a:bodyPr/>
+          <a:lstStyle/>
+          <a:p>
+            <a:fld id="{13601C0D-AD39-8143-8175-88B781727A80}" type="slidenum">
+              <a:rPr lang="en-US" smtClean="0"/>
+              <a:t>18</a:t>
+            </a:fld>
+            <a:endParaRPr lang="en-US"/>
+          </a:p>
+        </p:txBody>
+      </p:sp>
+    </p:spTree>
+    <p:extLst>
+      <p:ext uri="{BB962C8B-B14F-4D97-AF65-F5344CB8AC3E}">
+        <p14:creationId xmlns:p14="http://schemas.microsoft.com/office/powerpoint/2010/main" val="4165162000"/>
       </p:ext>
     </p:extLst>
   </p:cSld>
@@ -605,7 +858,7 @@
           <a:bodyPr/>
           <a:lstStyle/>
           <a:p>
-            <a:endParaRPr lang="en-US" dirty="0"/>
+            <a:endParaRPr lang="en-US"/>
           </a:p>
         </p:txBody>
       </p:sp>
@@ -689,7 +942,15 @@
           <a:bodyPr/>
           <a:lstStyle/>
           <a:p>
-            <a:endParaRPr lang="en-US" dirty="0"/>
+            <a:r>
+              <a:rPr lang="en-US" smtClean="0"/>
+              <a:t>dynamic programming:</a:t>
+            </a:r>
+            <a:r>
+              <a:rPr lang="en-US" baseline="0" smtClean="0"/>
+              <a:t> recursion, sub-problems. remember previous calculations.</a:t>
+            </a:r>
+            <a:endParaRPr lang="en-US"/>
           </a:p>
         </p:txBody>
       </p:sp>
@@ -710,7 +971,7 @@
           <a:p>
             <a:fld id="{13601C0D-AD39-8143-8175-88B781727A80}" type="slidenum">
               <a:rPr lang="en-US" smtClean="0"/>
-              <a:t>13</a:t>
+              <a:t>6</a:t>
             </a:fld>
             <a:endParaRPr lang="en-US"/>
           </a:p>
@@ -719,7 +980,7 @@
     </p:spTree>
     <p:extLst>
       <p:ext uri="{BB962C8B-B14F-4D97-AF65-F5344CB8AC3E}">
-        <p14:creationId xmlns:p14="http://schemas.microsoft.com/office/powerpoint/2010/main" val="4165162000"/>
+        <p14:creationId xmlns:p14="http://schemas.microsoft.com/office/powerpoint/2010/main" val="1970831275"/>
       </p:ext>
     </p:extLst>
   </p:cSld>
@@ -773,7 +1034,7 @@
           <a:bodyPr/>
           <a:lstStyle/>
           <a:p>
-            <a:endParaRPr lang="en-US" dirty="0"/>
+            <a:endParaRPr lang="en-US"/>
           </a:p>
         </p:txBody>
       </p:sp>
@@ -794,7 +1055,7 @@
           <a:p>
             <a:fld id="{13601C0D-AD39-8143-8175-88B781727A80}" type="slidenum">
               <a:rPr lang="en-US" smtClean="0"/>
-              <a:t>14</a:t>
+              <a:t>8</a:t>
             </a:fld>
             <a:endParaRPr lang="en-US"/>
           </a:p>
@@ -803,7 +1064,7 @@
     </p:spTree>
     <p:extLst>
       <p:ext uri="{BB962C8B-B14F-4D97-AF65-F5344CB8AC3E}">
-        <p14:creationId xmlns:p14="http://schemas.microsoft.com/office/powerpoint/2010/main" val="4165162000"/>
+        <p14:creationId xmlns:p14="http://schemas.microsoft.com/office/powerpoint/2010/main" val="3526970729"/>
       </p:ext>
     </p:extLst>
   </p:cSld>
@@ -857,7 +1118,11 @@
           <a:bodyPr/>
           <a:lstStyle/>
           <a:p>
-            <a:endParaRPr lang="en-US" dirty="0"/>
+            <a:r>
+              <a:rPr lang="en-US" smtClean="0"/>
+              <a:t>Ashley end</a:t>
+            </a:r>
+            <a:endParaRPr lang="en-US"/>
           </a:p>
         </p:txBody>
       </p:sp>
@@ -878,7 +1143,7 @@
           <a:p>
             <a:fld id="{13601C0D-AD39-8143-8175-88B781727A80}" type="slidenum">
               <a:rPr lang="en-US" smtClean="0"/>
-              <a:t>15</a:t>
+              <a:t>9</a:t>
             </a:fld>
             <a:endParaRPr lang="en-US"/>
           </a:p>
@@ -887,7 +1152,7 @@
     </p:spTree>
     <p:extLst>
       <p:ext uri="{BB962C8B-B14F-4D97-AF65-F5344CB8AC3E}">
-        <p14:creationId xmlns:p14="http://schemas.microsoft.com/office/powerpoint/2010/main" val="4165162000"/>
+        <p14:creationId xmlns:p14="http://schemas.microsoft.com/office/powerpoint/2010/main" val="2335575922"/>
       </p:ext>
     </p:extLst>
   </p:cSld>
@@ -941,7 +1206,15 @@
           <a:bodyPr/>
           <a:lstStyle/>
           <a:p>
-            <a:endParaRPr lang="en-US" dirty="0"/>
+            <a:r>
+              <a:rPr lang="en-US" smtClean="0"/>
+              <a:t>Sarah</a:t>
+            </a:r>
+            <a:r>
+              <a:rPr lang="en-US" baseline="0" smtClean="0"/>
+              <a:t> start</a:t>
+            </a:r>
+            <a:endParaRPr lang="en-US"/>
           </a:p>
         </p:txBody>
       </p:sp>
@@ -962,7 +1235,7 @@
           <a:p>
             <a:fld id="{13601C0D-AD39-8143-8175-88B781727A80}" type="slidenum">
               <a:rPr lang="en-US" smtClean="0"/>
-              <a:t>16</a:t>
+              <a:t>10</a:t>
             </a:fld>
             <a:endParaRPr lang="en-US"/>
           </a:p>
@@ -971,7 +1244,7 @@
     </p:spTree>
     <p:extLst>
       <p:ext uri="{BB962C8B-B14F-4D97-AF65-F5344CB8AC3E}">
-        <p14:creationId xmlns:p14="http://schemas.microsoft.com/office/powerpoint/2010/main" val="4165162000"/>
+        <p14:creationId xmlns:p14="http://schemas.microsoft.com/office/powerpoint/2010/main" val="3265360334"/>
       </p:ext>
     </p:extLst>
   </p:cSld>
@@ -1025,7 +1298,7 @@
           <a:bodyPr/>
           <a:lstStyle/>
           <a:p>
-            <a:endParaRPr lang="en-US" dirty="0"/>
+            <a:endParaRPr lang="en-US"/>
           </a:p>
         </p:txBody>
       </p:sp>
@@ -1046,7 +1319,7 @@
           <a:p>
             <a:fld id="{13601C0D-AD39-8143-8175-88B781727A80}" type="slidenum">
               <a:rPr lang="en-US" smtClean="0"/>
-              <a:t>17</a:t>
+              <a:t>13</a:t>
             </a:fld>
             <a:endParaRPr lang="en-US"/>
           </a:p>
@@ -1109,7 +1382,7 @@
           <a:bodyPr/>
           <a:lstStyle/>
           <a:p>
-            <a:endParaRPr lang="en-US" dirty="0"/>
+            <a:endParaRPr lang="en-US"/>
           </a:p>
         </p:txBody>
       </p:sp>
@@ -1130,7 +1403,91 @@
           <a:p>
             <a:fld id="{13601C0D-AD39-8143-8175-88B781727A80}" type="slidenum">
               <a:rPr lang="en-US" smtClean="0"/>
-              <a:t>18</a:t>
+              <a:t>14</a:t>
+            </a:fld>
+            <a:endParaRPr lang="en-US"/>
+          </a:p>
+        </p:txBody>
+      </p:sp>
+    </p:spTree>
+    <p:extLst>
+      <p:ext uri="{BB962C8B-B14F-4D97-AF65-F5344CB8AC3E}">
+        <p14:creationId xmlns:p14="http://schemas.microsoft.com/office/powerpoint/2010/main" val="4165162000"/>
+      </p:ext>
+    </p:extLst>
+  </p:cSld>
+  <p:clrMapOvr>
+    <a:masterClrMapping/>
+  </p:clrMapOvr>
+</p:notes>
+</file>
+
+<file path=ppt/notesSlides/notesSlide9.xml><?xml version="1.0" encoding="utf-8"?>
+<p:notes xmlns:a="http://schemas.openxmlformats.org/drawingml/2006/main" xmlns:r="http://schemas.openxmlformats.org/officeDocument/2006/relationships" xmlns:p="http://schemas.openxmlformats.org/presentationml/2006/main">
+  <p:cSld>
+    <p:spTree>
+      <p:nvGrpSpPr>
+        <p:cNvPr id="1" name=""/>
+        <p:cNvGrpSpPr/>
+        <p:nvPr/>
+      </p:nvGrpSpPr>
+      <p:grpSpPr>
+        <a:xfrm>
+          <a:off x="0" y="0"/>
+          <a:ext cx="0" cy="0"/>
+          <a:chOff x="0" y="0"/>
+          <a:chExt cx="0" cy="0"/>
+        </a:xfrm>
+      </p:grpSpPr>
+      <p:sp>
+        <p:nvSpPr>
+          <p:cNvPr id="2" name="Slide Image Placeholder 1"/>
+          <p:cNvSpPr>
+            <a:spLocks noGrp="1" noRot="1" noChangeAspect="1"/>
+          </p:cNvSpPr>
+          <p:nvPr>
+            <p:ph type="sldImg"/>
+          </p:nvPr>
+        </p:nvSpPr>
+        <p:spPr/>
+      </p:sp>
+      <p:sp>
+        <p:nvSpPr>
+          <p:cNvPr id="3" name="Notes Placeholder 2"/>
+          <p:cNvSpPr>
+            <a:spLocks noGrp="1"/>
+          </p:cNvSpPr>
+          <p:nvPr>
+            <p:ph type="body" idx="1"/>
+          </p:nvPr>
+        </p:nvSpPr>
+        <p:spPr/>
+        <p:txBody>
+          <a:bodyPr/>
+          <a:lstStyle/>
+          <a:p>
+            <a:endParaRPr lang="en-US"/>
+          </a:p>
+        </p:txBody>
+      </p:sp>
+      <p:sp>
+        <p:nvSpPr>
+          <p:cNvPr id="4" name="Slide Number Placeholder 3"/>
+          <p:cNvSpPr>
+            <a:spLocks noGrp="1"/>
+          </p:cNvSpPr>
+          <p:nvPr>
+            <p:ph type="sldNum" sz="quarter" idx="10"/>
+          </p:nvPr>
+        </p:nvSpPr>
+        <p:spPr/>
+        <p:txBody>
+          <a:bodyPr/>
+          <a:lstStyle/>
+          <a:p>
+            <a:fld id="{13601C0D-AD39-8143-8175-88B781727A80}" type="slidenum">
+              <a:rPr lang="en-US" smtClean="0"/>
+              <a:t>15</a:t>
             </a:fld>
             <a:endParaRPr lang="en-US"/>
           </a:p>
@@ -1330,7 +1687,7 @@
           <a:p>
             <a:fld id="{08CC8332-1ACC-4406-A169-8A73968D9A6C}" type="datetimeFigureOut">
               <a:rPr lang="en-US" smtClean="0"/>
-              <a:t>11/18/14</a:t>
+              <a:t>11/18/2014</a:t>
             </a:fld>
             <a:endParaRPr lang="en-US"/>
           </a:p>
@@ -1500,7 +1857,7 @@
           <a:p>
             <a:fld id="{08CC8332-1ACC-4406-A169-8A73968D9A6C}" type="datetimeFigureOut">
               <a:rPr lang="en-US" smtClean="0"/>
-              <a:t>11/18/14</a:t>
+              <a:t>11/18/2014</a:t>
             </a:fld>
             <a:endParaRPr lang="en-US"/>
           </a:p>
@@ -1680,7 +2037,7 @@
           <a:p>
             <a:fld id="{08CC8332-1ACC-4406-A169-8A73968D9A6C}" type="datetimeFigureOut">
               <a:rPr lang="en-US" smtClean="0"/>
-              <a:t>11/18/14</a:t>
+              <a:t>11/18/2014</a:t>
             </a:fld>
             <a:endParaRPr lang="en-US"/>
           </a:p>
@@ -1850,7 +2207,7 @@
           <a:p>
             <a:fld id="{08CC8332-1ACC-4406-A169-8A73968D9A6C}" type="datetimeFigureOut">
               <a:rPr lang="en-US" smtClean="0"/>
-              <a:t>11/18/14</a:t>
+              <a:t>11/18/2014</a:t>
             </a:fld>
             <a:endParaRPr lang="en-US"/>
           </a:p>
@@ -2096,7 +2453,7 @@
           <a:p>
             <a:fld id="{08CC8332-1ACC-4406-A169-8A73968D9A6C}" type="datetimeFigureOut">
               <a:rPr lang="en-US" smtClean="0"/>
-              <a:t>11/18/14</a:t>
+              <a:t>11/18/2014</a:t>
             </a:fld>
             <a:endParaRPr lang="en-US"/>
           </a:p>
@@ -2384,7 +2741,7 @@
           <a:p>
             <a:fld id="{08CC8332-1ACC-4406-A169-8A73968D9A6C}" type="datetimeFigureOut">
               <a:rPr lang="en-US" smtClean="0"/>
-              <a:t>11/18/14</a:t>
+              <a:t>11/18/2014</a:t>
             </a:fld>
             <a:endParaRPr lang="en-US"/>
           </a:p>
@@ -2806,7 +3163,7 @@
           <a:p>
             <a:fld id="{08CC8332-1ACC-4406-A169-8A73968D9A6C}" type="datetimeFigureOut">
               <a:rPr lang="en-US" smtClean="0"/>
-              <a:t>11/18/14</a:t>
+              <a:t>11/18/2014</a:t>
             </a:fld>
             <a:endParaRPr lang="en-US"/>
           </a:p>
@@ -2924,7 +3281,7 @@
           <a:p>
             <a:fld id="{08CC8332-1ACC-4406-A169-8A73968D9A6C}" type="datetimeFigureOut">
               <a:rPr lang="en-US" smtClean="0"/>
-              <a:t>11/18/14</a:t>
+              <a:t>11/18/2014</a:t>
             </a:fld>
             <a:endParaRPr lang="en-US"/>
           </a:p>
@@ -3019,7 +3376,7 @@
           <a:p>
             <a:fld id="{08CC8332-1ACC-4406-A169-8A73968D9A6C}" type="datetimeFigureOut">
               <a:rPr lang="en-US" smtClean="0"/>
-              <a:t>11/18/14</a:t>
+              <a:t>11/18/2014</a:t>
             </a:fld>
             <a:endParaRPr lang="en-US"/>
           </a:p>
@@ -3296,7 +3653,7 @@
           <a:p>
             <a:fld id="{08CC8332-1ACC-4406-A169-8A73968D9A6C}" type="datetimeFigureOut">
               <a:rPr lang="en-US" smtClean="0"/>
-              <a:t>11/18/14</a:t>
+              <a:t>11/18/2014</a:t>
             </a:fld>
             <a:endParaRPr lang="en-US"/>
           </a:p>
@@ -3549,7 +3906,7 @@
           <a:p>
             <a:fld id="{08CC8332-1ACC-4406-A169-8A73968D9A6C}" type="datetimeFigureOut">
               <a:rPr lang="en-US" smtClean="0"/>
-              <a:t>11/18/14</a:t>
+              <a:t>11/18/2014</a:t>
             </a:fld>
             <a:endParaRPr lang="en-US"/>
           </a:p>
@@ -3762,7 +4119,7 @@
           <a:p>
             <a:fld id="{08CC8332-1ACC-4406-A169-8A73968D9A6C}" type="datetimeFigureOut">
               <a:rPr lang="en-US" smtClean="0"/>
-              <a:t>11/18/14</a:t>
+              <a:t>11/18/2014</a:t>
             </a:fld>
             <a:endParaRPr lang="en-US"/>
           </a:p>
@@ -4155,10 +4512,10 @@
           <a:lstStyle/>
           <a:p>
             <a:r>
-              <a:rPr lang="en-US" dirty="0" smtClean="0"/>
+              <a:rPr lang="en-US" smtClean="0"/>
               <a:t>A Genetic Algorithm Solution to the Multi-Objective 0-1 Knapsack Problem</a:t>
             </a:r>
-            <a:endParaRPr lang="en-US" dirty="0"/>
+            <a:endParaRPr lang="en-US"/>
           </a:p>
         </p:txBody>
       </p:sp>
@@ -4185,39 +4542,39 @@
           <a:lstStyle/>
           <a:p>
             <a:r>
-              <a:rPr lang="en-US" dirty="0" smtClean="0"/>
+              <a:rPr lang="en-US" smtClean="0"/>
               <a:t>University of Louisville</a:t>
             </a:r>
           </a:p>
           <a:p>
             <a:r>
-              <a:rPr lang="en-US" dirty="0" smtClean="0"/>
+              <a:rPr lang="en-US" smtClean="0"/>
               <a:t>CECS 545</a:t>
             </a:r>
           </a:p>
           <a:p>
             <a:r>
-              <a:rPr lang="en-US" dirty="0" smtClean="0"/>
+              <a:rPr lang="en-US" smtClean="0"/>
               <a:t>Sarah Mullins</a:t>
             </a:r>
           </a:p>
           <a:p>
             <a:r>
-              <a:rPr lang="en-US" dirty="0" smtClean="0"/>
+              <a:rPr lang="en-US" smtClean="0"/>
               <a:t>Ashley </a:t>
             </a:r>
             <a:r>
-              <a:rPr lang="en-US" dirty="0" err="1" smtClean="0"/>
+              <a:rPr lang="en-US" err="1" smtClean="0"/>
               <a:t>Revlett</a:t>
             </a:r>
-            <a:endParaRPr lang="en-US" dirty="0" smtClean="0"/>
-          </a:p>
-          <a:p>
-            <a:r>
-              <a:rPr lang="en-US" dirty="0" smtClean="0"/>
+            <a:endParaRPr lang="en-US" smtClean="0"/>
+          </a:p>
+          <a:p>
+            <a:r>
+              <a:rPr lang="en-US" smtClean="0"/>
               <a:t>November 19, 2014</a:t>
             </a:r>
-            <a:endParaRPr lang="en-US" dirty="0"/>
+            <a:endParaRPr lang="en-US"/>
           </a:p>
         </p:txBody>
       </p:sp>
@@ -4269,10 +4626,10 @@
           <a:lstStyle/>
           <a:p>
             <a:r>
-              <a:rPr lang="en-US" sz="3600" dirty="0" smtClean="0"/>
+              <a:rPr lang="en-US" sz="3600" smtClean="0"/>
               <a:t>Calculating Fitness Score of an Item</a:t>
             </a:r>
-            <a:endParaRPr lang="en-US" sz="3600" dirty="0"/>
+            <a:endParaRPr lang="en-US" sz="3600"/>
           </a:p>
         </p:txBody>
       </p:sp>
@@ -4302,221 +4659,185 @@
               <a:buAutoNum type="arabicPeriod"/>
             </a:pPr>
             <a:r>
-              <a:rPr lang="en-US" dirty="0" smtClean="0"/>
+              <a:rPr lang="en-US" smtClean="0"/>
               <a:t>For each objective, normalize values to 0-1:</a:t>
             </a:r>
           </a:p>
           <a:p>
             <a:r>
-              <a:rPr lang="en-US" dirty="0" err="1" smtClean="0">
+              <a:rPr lang="en-US" smtClean="0">
                 <a:latin typeface="Courier New"/>
               </a:rPr>
-              <a:t>Weight_score</a:t>
-            </a:r>
-            <a:r>
-              <a:rPr lang="en-US" dirty="0" smtClean="0">
-                <a:latin typeface="Courier New"/>
-              </a:rPr>
-              <a:t> = weight/</a:t>
-            </a:r>
-            <a:r>
-              <a:rPr lang="en-US" dirty="0" err="1" smtClean="0">
+              <a:t>Weight_score = weight/</a:t>
+            </a:r>
+            <a:r>
+              <a:rPr lang="en-US" err="1" smtClean="0">
                 <a:latin typeface="Courier New"/>
               </a:rPr>
               <a:t>max_weight</a:t>
             </a:r>
             <a:r>
-              <a:rPr lang="en-US" dirty="0" smtClean="0">
+              <a:rPr lang="en-US" smtClean="0">
                 <a:latin typeface="Courier New"/>
               </a:rPr>
               <a:t/>
             </a:r>
             <a:br>
-              <a:rPr lang="en-US" dirty="0" smtClean="0">
+              <a:rPr lang="en-US" smtClean="0">
                 <a:latin typeface="Courier New"/>
               </a:rPr>
             </a:br>
             <a:r>
-              <a:rPr lang="en-US" dirty="0" err="1" smtClean="0">
+              <a:rPr lang="en-US" err="1" smtClean="0">
                 <a:latin typeface="Courier New"/>
               </a:rPr>
               <a:t>Value_score</a:t>
             </a:r>
             <a:r>
-              <a:rPr lang="en-US" dirty="0" smtClean="0">
+              <a:rPr lang="en-US" smtClean="0">
                 <a:latin typeface="Courier New"/>
               </a:rPr>
               <a:t>  = value/</a:t>
             </a:r>
             <a:r>
-              <a:rPr lang="en-US" dirty="0" err="1" smtClean="0">
+              <a:rPr lang="en-US" err="1" smtClean="0">
                 <a:latin typeface="Courier New"/>
               </a:rPr>
               <a:t>max_value</a:t>
             </a:r>
             <a:r>
-              <a:rPr lang="en-US" dirty="0" smtClean="0">
+              <a:rPr lang="en-US" smtClean="0">
                 <a:latin typeface="Courier New"/>
               </a:rPr>
               <a:t/>
             </a:r>
             <a:br>
-              <a:rPr lang="en-US" dirty="0" smtClean="0">
+              <a:rPr lang="en-US" smtClean="0">
                 <a:latin typeface="Courier New"/>
               </a:rPr>
             </a:br>
             <a:r>
-              <a:rPr lang="en-US" dirty="0" err="1" smtClean="0">
+              <a:rPr lang="en-US" err="1" smtClean="0">
                 <a:latin typeface="Courier New"/>
               </a:rPr>
               <a:t>Price_score</a:t>
             </a:r>
             <a:r>
-              <a:rPr lang="en-US" dirty="0" smtClean="0">
+              <a:rPr lang="en-US" smtClean="0">
                 <a:latin typeface="Courier New"/>
               </a:rPr>
               <a:t>  = price/</a:t>
             </a:r>
             <a:r>
-              <a:rPr lang="en-US" dirty="0" err="1" smtClean="0">
+              <a:rPr lang="en-US" err="1" smtClean="0">
                 <a:latin typeface="Courier New"/>
               </a:rPr>
               <a:t>max_price</a:t>
             </a:r>
-            <a:endParaRPr lang="en-US" dirty="0">
+            <a:endParaRPr lang="en-US">
               <a:latin typeface="Courier New"/>
             </a:endParaRPr>
           </a:p>
           <a:p>
-            <a:endParaRPr lang="en-US" dirty="0" smtClean="0">
+            <a:endParaRPr lang="en-US" smtClean="0">
               <a:latin typeface="Courier New"/>
             </a:endParaRPr>
           </a:p>
           <a:p>
             <a:r>
-              <a:rPr lang="en-US" dirty="0" smtClean="0"/>
+              <a:rPr lang="en-US" smtClean="0"/>
               <a:t>2. For parameters to minimize, invert the scores:</a:t>
             </a:r>
           </a:p>
           <a:p>
             <a:r>
-              <a:rPr lang="en-US" dirty="0" err="1" smtClean="0">
+              <a:rPr lang="en-US" smtClean="0">
                 <a:latin typeface="Courier New"/>
               </a:rPr>
-              <a:t>Weight_score</a:t>
-            </a:r>
-            <a:r>
-              <a:rPr lang="en-US" dirty="0" smtClean="0">
-                <a:latin typeface="Courier New"/>
-              </a:rPr>
-              <a:t> = 1 - </a:t>
-            </a:r>
-            <a:r>
-              <a:rPr lang="en-US" dirty="0" err="1" smtClean="0">
-                <a:latin typeface="Courier New"/>
-              </a:rPr>
-              <a:t>Weight_score</a:t>
-            </a:r>
-            <a:r>
-              <a:rPr lang="en-US" dirty="0" smtClean="0">
-                <a:latin typeface="Courier New"/>
-              </a:rPr>
-              <a:t/>
+              <a:t>Weight_score = 1 - Weight_score</a:t>
             </a:r>
             <a:br>
-              <a:rPr lang="en-US" dirty="0" smtClean="0">
+              <a:rPr lang="en-US" smtClean="0">
                 <a:latin typeface="Courier New"/>
               </a:rPr>
             </a:br>
             <a:r>
-              <a:rPr lang="en-US" dirty="0" err="1" smtClean="0">
+              <a:rPr lang="en-US" err="1" smtClean="0">
                 <a:latin typeface="Courier New"/>
               </a:rPr>
               <a:t>Price_score</a:t>
             </a:r>
             <a:r>
-              <a:rPr lang="en-US" dirty="0" smtClean="0">
+              <a:rPr lang="en-US" smtClean="0">
                 <a:latin typeface="Courier New"/>
               </a:rPr>
               <a:t>  = 1 - </a:t>
             </a:r>
             <a:r>
-              <a:rPr lang="en-US" dirty="0" err="1" smtClean="0">
+              <a:rPr lang="en-US" err="1" smtClean="0">
                 <a:latin typeface="Courier New"/>
               </a:rPr>
               <a:t>Price_score</a:t>
             </a:r>
             <a:r>
-              <a:rPr lang="en-US" dirty="0" smtClean="0">
+              <a:rPr lang="en-US" smtClean="0">
                 <a:latin typeface="Courier New"/>
               </a:rPr>
               <a:t> </a:t>
             </a:r>
           </a:p>
           <a:p>
-            <a:endParaRPr lang="en-US" dirty="0" smtClean="0"/>
-          </a:p>
-          <a:p>
-            <a:r>
-              <a:rPr lang="en-US" dirty="0"/>
+            <a:endParaRPr lang="en-US" smtClean="0"/>
+          </a:p>
+          <a:p>
+            <a:r>
+              <a:rPr lang="en-US"/>
               <a:t>3</a:t>
             </a:r>
             <a:r>
-              <a:rPr lang="en-US" dirty="0" smtClean="0"/>
+              <a:rPr lang="en-US" smtClean="0"/>
               <a:t>. Sum the scores :</a:t>
             </a:r>
-            <a:endParaRPr lang="en-US" dirty="0"/>
-          </a:p>
-          <a:p>
-            <a:r>
-              <a:rPr lang="en-US" dirty="0" smtClean="0">
+            <a:endParaRPr lang="en-US"/>
+          </a:p>
+          <a:p>
+            <a:r>
+              <a:rPr lang="en-US" smtClean="0">
                 <a:latin typeface="Courier New"/>
               </a:rPr>
-              <a:t>Fitness = </a:t>
-            </a:r>
-            <a:r>
-              <a:rPr lang="en-US" dirty="0" err="1" smtClean="0">
-                <a:latin typeface="Courier New"/>
-              </a:rPr>
-              <a:t>Weight_score</a:t>
-            </a:r>
-            <a:r>
-              <a:rPr lang="en-US" dirty="0" smtClean="0">
-                <a:latin typeface="Courier New"/>
-              </a:rPr>
-              <a:t> +  </a:t>
-            </a:r>
-            <a:r>
-              <a:rPr lang="en-US" dirty="0" err="1" smtClean="0">
+              <a:t>Fitness = Weight_score +  </a:t>
+            </a:r>
+            <a:r>
+              <a:rPr lang="en-US" err="1" smtClean="0">
                 <a:latin typeface="Courier New"/>
               </a:rPr>
               <a:t>Value_score</a:t>
             </a:r>
             <a:r>
-              <a:rPr lang="en-US" dirty="0" smtClean="0">
+              <a:rPr lang="en-US" smtClean="0">
                 <a:latin typeface="Courier New"/>
               </a:rPr>
               <a:t> + </a:t>
             </a:r>
             <a:r>
-              <a:rPr lang="en-US" dirty="0" err="1" smtClean="0">
+              <a:rPr lang="en-US" err="1" smtClean="0">
                 <a:latin typeface="Courier New"/>
               </a:rPr>
               <a:t>Price_score</a:t>
             </a:r>
-            <a:endParaRPr lang="en-US" dirty="0">
+            <a:endParaRPr lang="en-US">
               <a:latin typeface="Courier New"/>
             </a:endParaRPr>
           </a:p>
           <a:p>
-            <a:endParaRPr lang="en-US" dirty="0" smtClean="0"/>
-          </a:p>
-          <a:p>
-            <a:r>
-              <a:rPr lang="en-US" dirty="0" smtClean="0"/>
+            <a:endParaRPr lang="en-US" smtClean="0"/>
+          </a:p>
+          <a:p>
+            <a:r>
+              <a:rPr lang="en-US" smtClean="0"/>
               <a:t>4. This aggregate fitness score will be higher for items with high values and low prices and weights.</a:t>
             </a:r>
-            <a:endParaRPr lang="en-US" dirty="0">
+            <a:endParaRPr lang="en-US">
               <a:latin typeface="Courier New"/>
             </a:endParaRPr>
           </a:p>
@@ -4531,7 +4852,7 @@
           <p:nvPr/>
         </p:nvPicPr>
         <p:blipFill>
-          <a:blip r:embed="rId2">
+          <a:blip r:embed="rId3">
             <a:extLst>
               <a:ext uri="{28A0092B-C50C-407E-A947-70E740481C1C}">
                 <a14:useLocalDpi xmlns:a14="http://schemas.microsoft.com/office/drawing/2010/main" val="0"/>
@@ -4575,26 +4896,26 @@
           <a:lstStyle/>
           <a:p>
             <a:r>
-              <a:rPr lang="en-US" sz="1400" dirty="0" smtClean="0">
+              <a:rPr lang="en-US" sz="1400" smtClean="0">
                 <a:latin typeface="Courier New"/>
               </a:rPr>
               <a:t>EXAMPLE:</a:t>
             </a:r>
           </a:p>
           <a:p>
-            <a:endParaRPr lang="en-US" sz="1400" dirty="0" smtClean="0">
+            <a:endParaRPr lang="en-US" sz="1400" smtClean="0">
               <a:latin typeface="Courier New"/>
             </a:endParaRPr>
           </a:p>
           <a:p>
             <a:r>
-              <a:rPr lang="en-US" sz="1400" dirty="0" err="1" smtClean="0">
+              <a:rPr lang="en-US" sz="1400" err="1" smtClean="0">
                 <a:latin typeface="Courier New"/>
               </a:rPr>
               <a:t>max_weight</a:t>
             </a:r>
             <a:r>
-              <a:rPr lang="en-US" sz="1400" dirty="0" smtClean="0">
+              <a:rPr lang="en-US" sz="1400" smtClean="0">
                 <a:latin typeface="Courier New"/>
               </a:rPr>
               <a:t> = 10</a:t>
@@ -4602,13 +4923,13 @@
           </a:p>
           <a:p>
             <a:r>
-              <a:rPr lang="en-US" sz="1400" dirty="0" err="1" smtClean="0">
+              <a:rPr lang="en-US" sz="1400" err="1" smtClean="0">
                 <a:latin typeface="Courier New"/>
               </a:rPr>
               <a:t>max_value</a:t>
             </a:r>
             <a:r>
-              <a:rPr lang="en-US" sz="1400" dirty="0" smtClean="0">
+              <a:rPr lang="en-US" sz="1400" smtClean="0">
                 <a:latin typeface="Courier New"/>
               </a:rPr>
               <a:t>  = 5</a:t>
@@ -4616,81 +4937,75 @@
           </a:p>
           <a:p>
             <a:r>
-              <a:rPr lang="en-US" sz="1400" dirty="0" err="1" smtClean="0">
+              <a:rPr lang="en-US" sz="1400" err="1" smtClean="0">
                 <a:latin typeface="Courier New"/>
               </a:rPr>
               <a:t>max_price</a:t>
             </a:r>
             <a:r>
-              <a:rPr lang="en-US" sz="1400" dirty="0" smtClean="0">
+              <a:rPr lang="en-US" sz="1400" smtClean="0">
                 <a:latin typeface="Courier New"/>
               </a:rPr>
               <a:t>  = 30</a:t>
             </a:r>
           </a:p>
           <a:p>
-            <a:endParaRPr lang="en-US" sz="1400" dirty="0" smtClean="0">
+            <a:endParaRPr lang="en-US" sz="1400" smtClean="0">
               <a:latin typeface="Courier New"/>
             </a:endParaRPr>
           </a:p>
           <a:p>
             <a:r>
-              <a:rPr lang="en-US" sz="1400" dirty="0" err="1" smtClean="0">
+              <a:rPr lang="en-US" sz="1400" smtClean="0">
                 <a:latin typeface="Courier New"/>
               </a:rPr>
-              <a:t>Weight_score</a:t>
-            </a:r>
-            <a:r>
-              <a:rPr lang="en-US" sz="1400" dirty="0" smtClean="0">
-                <a:latin typeface="Courier New"/>
-              </a:rPr>
-              <a:t> = .9</a:t>
-            </a:r>
-          </a:p>
-          <a:p>
-            <a:r>
-              <a:rPr lang="en-US" sz="1400" dirty="0" err="1" smtClean="0">
+              <a:t>Weight_score = .9</a:t>
+            </a:r>
+          </a:p>
+          <a:p>
+            <a:r>
+              <a:rPr lang="en-US" sz="1400" err="1" smtClean="0">
                 <a:latin typeface="Courier New"/>
               </a:rPr>
               <a:t>Value_score</a:t>
             </a:r>
             <a:r>
-              <a:rPr lang="en-US" sz="1400" dirty="0" smtClean="0">
+              <a:rPr lang="en-US" sz="1400" smtClean="0">
                 <a:latin typeface="Courier New"/>
               </a:rPr>
               <a:t> = .06</a:t>
             </a:r>
             <a:br>
-              <a:rPr lang="en-US" sz="1400" dirty="0" smtClean="0">
+              <a:rPr lang="en-US" sz="1400" smtClean="0">
                 <a:latin typeface="Courier New"/>
               </a:rPr>
             </a:br>
             <a:r>
-              <a:rPr lang="en-US" sz="1400" dirty="0" err="1" smtClean="0">
+              <a:rPr lang="en-US" sz="1400" err="1" smtClean="0">
                 <a:latin typeface="Courier New"/>
               </a:rPr>
               <a:t>Price_score</a:t>
             </a:r>
             <a:r>
-              <a:rPr lang="en-US" sz="1400" dirty="0" smtClean="0">
+              <a:rPr lang="en-US" sz="1400" smtClean="0">
                 <a:latin typeface="Courier New"/>
               </a:rPr>
               <a:t> = .89</a:t>
             </a:r>
           </a:p>
           <a:p>
-            <a:endParaRPr lang="en-US" sz="1400" dirty="0" smtClean="0">
+            <a:endParaRPr lang="en-US" sz="1400" smtClean="0">
               <a:latin typeface="Courier New"/>
             </a:endParaRPr>
           </a:p>
           <a:p>
             <a:r>
-              <a:rPr lang="en-US" sz="1400" b="1" dirty="0" smtClean="0">
+              <a:rPr lang="en-US" sz="1400" b="1" smtClean="0">
                 <a:latin typeface="Courier New"/>
               </a:rPr>
               <a:t>Fitness = 1.85</a:t>
             </a:r>
-            <a:endParaRPr lang="en-US" sz="1400" b="1" dirty="0">
+            <a:endParaRPr lang="en-US" sz="1400" b="1">
               <a:latin typeface="Courier New"/>
             </a:endParaRPr>
           </a:p>
@@ -4744,10 +5059,10 @@
           <a:lstStyle/>
           <a:p>
             <a:r>
-              <a:rPr lang="en-US" sz="3600" dirty="0" smtClean="0"/>
+              <a:rPr lang="en-US" sz="3600" smtClean="0"/>
               <a:t>Calculating Fitness Score of a Solution</a:t>
             </a:r>
-            <a:endParaRPr lang="en-US" sz="3600" dirty="0"/>
+            <a:endParaRPr lang="en-US" sz="3600"/>
           </a:p>
         </p:txBody>
       </p:sp>
@@ -4778,7 +5093,7 @@
               <a:buChar char="•"/>
             </a:pPr>
             <a:r>
-              <a:rPr lang="en-US" dirty="0" smtClean="0"/>
+              <a:rPr lang="en-US" smtClean="0"/>
               <a:t>Sum the fitness scores for all items included in the knapsack.</a:t>
             </a:r>
           </a:p>
@@ -4806,7 +5121,7 @@
           <a:graphicData uri="http://schemas.openxmlformats.org/presentationml/2006/ole">
             <mc:AlternateContent xmlns:mc="http://schemas.openxmlformats.org/markup-compatibility/2006">
               <mc:Choice xmlns:v="urn:schemas-microsoft-com:vml" Requires="v">
-                <p:oleObj spid="_x0000_s1030" name="Document" r:id="rId3" imgW="5486400" imgH="838200" progId="Word.Document.12">
+                <p:oleObj spid="_x0000_s1035" name="Document" r:id="rId3" imgW="5486400" imgH="838200" progId="Word.Document.12">
                   <p:link updateAutomatic="1"/>
                 </p:oleObj>
               </mc:Choice>
@@ -4889,10 +5204,10 @@
           <a:lstStyle/>
           <a:p>
             <a:r>
-              <a:rPr lang="en-US" dirty="0" smtClean="0"/>
+              <a:rPr lang="en-US" smtClean="0"/>
               <a:t>Mutation &amp; Crossover Operators</a:t>
             </a:r>
-            <a:endParaRPr lang="en-US" dirty="0"/>
+            <a:endParaRPr lang="en-US"/>
           </a:p>
         </p:txBody>
       </p:sp>
@@ -4914,37 +5229,37 @@
         </p:spPr>
         <p:txBody>
           <a:bodyPr>
-            <a:normAutofit fontScale="85000" lnSpcReduction="10000"/>
+            <a:normAutofit fontScale="92500" lnSpcReduction="10000"/>
           </a:bodyPr>
           <a:lstStyle/>
           <a:p>
             <a:r>
-              <a:rPr lang="en-US" b="1" dirty="0" smtClean="0"/>
+              <a:rPr lang="en-US" b="1" smtClean="0"/>
               <a:t>Mutation: </a:t>
             </a:r>
             <a:r>
-              <a:rPr lang="en-US" dirty="0" smtClean="0"/>
+              <a:rPr lang="en-US" smtClean="0"/>
               <a:t>Flip a random number of bits in the solution’s chromosome. If the result is over capacity, remove the least fit items until within capacity.</a:t>
             </a:r>
           </a:p>
           <a:p>
             <a:r>
-              <a:rPr lang="en-US" b="1" dirty="0" smtClean="0"/>
+              <a:rPr lang="en-US" b="1" smtClean="0"/>
               <a:t>Crossover: </a:t>
             </a:r>
             <a:r>
-              <a:rPr lang="en-US" dirty="0" smtClean="0"/>
+              <a:rPr lang="en-US" smtClean="0"/>
               <a:t>Choose 2 parents, A and B, and combine the first half of A’s chromosome with the second half of B’s chromosome. </a:t>
             </a:r>
             <a:r>
-              <a:rPr lang="en-US" dirty="0"/>
+              <a:rPr lang="en-US"/>
               <a:t>If the result is over capacity, remove the least fit items until within capacity</a:t>
             </a:r>
             <a:r>
-              <a:rPr lang="en-US" dirty="0" smtClean="0"/>
+              <a:rPr lang="en-US" smtClean="0"/>
               <a:t>.</a:t>
             </a:r>
-            <a:endParaRPr lang="en-US" dirty="0"/>
+            <a:endParaRPr lang="en-US"/>
           </a:p>
         </p:txBody>
       </p:sp>
@@ -5029,10 +5344,10 @@
           <a:lstStyle/>
           <a:p>
             <a:r>
-              <a:rPr lang="en-US" dirty="0" smtClean="0"/>
+              <a:rPr lang="en-US" smtClean="0"/>
               <a:t>Crowd Wisdom</a:t>
             </a:r>
-            <a:endParaRPr lang="en-US" dirty="0"/>
+            <a:endParaRPr lang="en-US"/>
           </a:p>
         </p:txBody>
       </p:sp>
@@ -5059,36 +5374,36 @@
           <a:lstStyle/>
           <a:p>
             <a:r>
-              <a:rPr lang="en-US" dirty="0" smtClean="0"/>
+              <a:rPr lang="en-US" smtClean="0"/>
               <a:t>Genetic Algorithm is run many times to produce many good </a:t>
             </a:r>
             <a:r>
-              <a:rPr lang="en-US" dirty="0"/>
+              <a:rPr lang="en-US"/>
               <a:t>but not necessarily optimal </a:t>
             </a:r>
             <a:r>
-              <a:rPr lang="en-US" dirty="0" smtClean="0"/>
+              <a:rPr lang="en-US" smtClean="0"/>
               <a:t>solutions</a:t>
             </a:r>
           </a:p>
           <a:p>
             <a:r>
-              <a:rPr lang="en-US" dirty="0" smtClean="0"/>
+              <a:rPr lang="en-US" smtClean="0"/>
               <a:t>Crowd is analyzed to determine most commonly shared items</a:t>
             </a:r>
           </a:p>
           <a:p>
             <a:r>
-              <a:rPr lang="en-US" dirty="0" smtClean="0"/>
+              <a:rPr lang="en-US" smtClean="0"/>
               <a:t>New solution is created from these common items, then fittest remaining items are added until capacity is reached.</a:t>
             </a:r>
           </a:p>
           <a:p>
             <a:r>
-              <a:rPr lang="en-US" dirty="0" smtClean="0"/>
+              <a:rPr lang="en-US" smtClean="0"/>
               <a:t>In our experiments, the new solution was never better than the best crowd member. Often the same solution was discovered, or a less optimal solution.</a:t>
             </a:r>
-            <a:endParaRPr lang="en-US" dirty="0"/>
+            <a:endParaRPr lang="en-US"/>
           </a:p>
         </p:txBody>
       </p:sp>
@@ -5170,30 +5485,29 @@
           <a:lstStyle/>
           <a:p>
             <a:r>
-              <a:rPr lang="en-US" dirty="0" smtClean="0"/>
+              <a:rPr lang="en-US" smtClean="0"/>
               <a:t>Results (</a:t>
             </a:r>
             <a:r>
-              <a:rPr lang="en-US" dirty="0"/>
+              <a:rPr lang="en-US"/>
               <a:t>n</a:t>
             </a:r>
             <a:r>
-              <a:rPr lang="en-US" dirty="0" smtClean="0"/>
+              <a:rPr lang="en-US" smtClean="0"/>
               <a:t>=100</a:t>
             </a:r>
             <a:r>
-              <a:rPr lang="en-US" dirty="0"/>
+              <a:rPr lang="en-US"/>
               <a:t>, c</a:t>
             </a:r>
             <a:r>
-              <a:rPr lang="en-US" dirty="0" smtClean="0"/>
+              <a:rPr lang="en-US" smtClean="0"/>
               <a:t>=300</a:t>
             </a:r>
             <a:r>
-              <a:rPr lang="en-US" dirty="0"/>
+              <a:rPr lang="en-US"/>
               <a:t>)</a:t>
             </a:r>
-            <a:endParaRPr lang="en-US" dirty="0"/>
           </a:p>
         </p:txBody>
       </p:sp>
@@ -5215,7 +5529,7 @@
         </p:spPr>
         <p:txBody>
           <a:bodyPr>
-            <a:normAutofit fontScale="55000" lnSpcReduction="20000"/>
+            <a:normAutofit fontScale="62500" lnSpcReduction="20000"/>
           </a:bodyPr>
           <a:lstStyle/>
           <a:p>
@@ -5223,28 +5537,24 @@
               <a:buNone/>
             </a:pPr>
             <a:r>
-              <a:rPr lang="en-US" dirty="0" smtClean="0"/>
+              <a:rPr lang="en-US" smtClean="0"/>
               <a:t>Solution evolution over 70 </a:t>
             </a:r>
             <a:r>
-              <a:rPr lang="en-US" dirty="0"/>
+              <a:rPr lang="en-US"/>
               <a:t>generations for n = 100, c = </a:t>
             </a:r>
             <a:r>
-              <a:rPr lang="en-US" dirty="0" smtClean="0"/>
+              <a:rPr lang="en-US" smtClean="0"/>
               <a:t>300. Population size = 60. Crowd size = 25.</a:t>
             </a:r>
             <a:r>
-              <a:rPr lang="en-US" dirty="0"/>
+              <a:rPr lang="en-US"/>
               <a:t> </a:t>
             </a:r>
             <a:r>
-              <a:rPr lang="en-US" dirty="0" smtClean="0"/>
-              <a:t>Each color line is a different crowd member. Runtime: </a:t>
-            </a:r>
-            <a:r>
-              <a:rPr lang="en-US" dirty="0" smtClean="0"/>
-              <a:t>15.34 sec</a:t>
+              <a:rPr lang="en-US" smtClean="0"/>
+              <a:t>Each color line is a different crowd member. Runtime: 15.34 sec</a:t>
             </a:r>
           </a:p>
         </p:txBody>
@@ -5327,10 +5637,10 @@
           <a:lstStyle/>
           <a:p>
             <a:r>
-              <a:rPr lang="en-US" dirty="0" smtClean="0"/>
+              <a:rPr lang="en-US" smtClean="0"/>
               <a:t>Results (n=300, c=600)</a:t>
             </a:r>
-            <a:endParaRPr lang="en-US" dirty="0"/>
+            <a:endParaRPr lang="en-US"/>
           </a:p>
         </p:txBody>
       </p:sp>
@@ -5352,7 +5662,7 @@
         </p:spPr>
         <p:txBody>
           <a:bodyPr>
-            <a:normAutofit fontScale="70000" lnSpcReduction="20000"/>
+            <a:normAutofit fontScale="85000" lnSpcReduction="20000"/>
           </a:bodyPr>
           <a:lstStyle/>
           <a:p>
@@ -5360,36 +5670,32 @@
               <a:buNone/>
             </a:pPr>
             <a:r>
-              <a:rPr lang="en-US" dirty="0" smtClean="0"/>
+              <a:rPr lang="en-US" smtClean="0"/>
               <a:t>Solution evolution over 70 </a:t>
             </a:r>
             <a:r>
-              <a:rPr lang="en-US" dirty="0"/>
+              <a:rPr lang="en-US"/>
               <a:t>generations for n = </a:t>
             </a:r>
             <a:r>
-              <a:rPr lang="en-US" dirty="0" smtClean="0"/>
+              <a:rPr lang="en-US" smtClean="0"/>
               <a:t>300</a:t>
             </a:r>
             <a:r>
-              <a:rPr lang="en-US" dirty="0"/>
+              <a:rPr lang="en-US"/>
               <a:t>, c = </a:t>
             </a:r>
             <a:r>
-              <a:rPr lang="en-US" dirty="0" smtClean="0"/>
+              <a:rPr lang="en-US" smtClean="0"/>
               <a:t>600. Population size = 60. Crowd size = 25.</a:t>
             </a:r>
             <a:r>
-              <a:rPr lang="en-US" dirty="0"/>
+              <a:rPr lang="en-US"/>
               <a:t> </a:t>
             </a:r>
             <a:r>
-              <a:rPr lang="en-US" dirty="0" smtClean="0"/>
-              <a:t>Runtime: </a:t>
-            </a:r>
-            <a:r>
-              <a:rPr lang="en-US" dirty="0" smtClean="0"/>
-              <a:t>90.55 sec</a:t>
+              <a:rPr lang="en-US" smtClean="0"/>
+              <a:t>Runtime: 90.55 sec</a:t>
             </a:r>
           </a:p>
         </p:txBody>
@@ -5472,10 +5778,10 @@
           <a:lstStyle/>
           <a:p>
             <a:r>
-              <a:rPr lang="en-US" dirty="0" smtClean="0"/>
+              <a:rPr lang="en-US" smtClean="0"/>
               <a:t>Results (n=600, c=1200)</a:t>
             </a:r>
-            <a:endParaRPr lang="en-US" dirty="0"/>
+            <a:endParaRPr lang="en-US"/>
           </a:p>
         </p:txBody>
       </p:sp>
@@ -5497,7 +5803,7 @@
         </p:spPr>
         <p:txBody>
           <a:bodyPr>
-            <a:normAutofit fontScale="70000" lnSpcReduction="20000"/>
+            <a:normAutofit fontScale="77500" lnSpcReduction="20000"/>
           </a:bodyPr>
           <a:lstStyle/>
           <a:p>
@@ -5505,36 +5811,32 @@
               <a:buNone/>
             </a:pPr>
             <a:r>
-              <a:rPr lang="en-US" dirty="0" smtClean="0"/>
+              <a:rPr lang="en-US" smtClean="0"/>
               <a:t>Solution evolution over 70 </a:t>
             </a:r>
             <a:r>
-              <a:rPr lang="en-US" dirty="0"/>
+              <a:rPr lang="en-US"/>
               <a:t>generations for n = </a:t>
             </a:r>
             <a:r>
-              <a:rPr lang="en-US" dirty="0" smtClean="0"/>
+              <a:rPr lang="en-US" smtClean="0"/>
               <a:t>600</a:t>
             </a:r>
             <a:r>
-              <a:rPr lang="en-US" dirty="0"/>
+              <a:rPr lang="en-US"/>
               <a:t>, c = </a:t>
             </a:r>
             <a:r>
-              <a:rPr lang="en-US" dirty="0" smtClean="0"/>
+              <a:rPr lang="en-US" smtClean="0"/>
               <a:t>1200. Population size = 60. Crowd size = 25.</a:t>
             </a:r>
             <a:r>
-              <a:rPr lang="en-US" dirty="0"/>
+              <a:rPr lang="en-US"/>
               <a:t> </a:t>
             </a:r>
             <a:r>
-              <a:rPr lang="en-US" dirty="0" smtClean="0"/>
-              <a:t>Runtime: 316.61 </a:t>
-            </a:r>
-            <a:r>
-              <a:rPr lang="en-US" dirty="0" smtClean="0"/>
-              <a:t>sec</a:t>
+              <a:rPr lang="en-US" smtClean="0"/>
+              <a:t>Runtime: 316.61 sec</a:t>
             </a:r>
           </a:p>
         </p:txBody>
@@ -5617,10 +5919,10 @@
           <a:lstStyle/>
           <a:p>
             <a:r>
-              <a:rPr lang="en-US" dirty="0" smtClean="0"/>
+              <a:rPr lang="en-US" smtClean="0"/>
               <a:t>Further Areas for Research</a:t>
             </a:r>
-            <a:endParaRPr lang="en-US" dirty="0"/>
+            <a:endParaRPr lang="en-US"/>
           </a:p>
         </p:txBody>
       </p:sp>
@@ -5640,36 +5942,36 @@
           <a:lstStyle/>
           <a:p>
             <a:r>
-              <a:rPr lang="en-US" dirty="0" smtClean="0"/>
+              <a:rPr lang="en-US" smtClean="0"/>
               <a:t>Adding weights to each objective</a:t>
             </a:r>
           </a:p>
           <a:p>
             <a:r>
-              <a:rPr lang="en-US" dirty="0" smtClean="0"/>
+              <a:rPr lang="en-US" smtClean="0"/>
               <a:t>Increasing number of objectives</a:t>
             </a:r>
           </a:p>
           <a:p>
             <a:r>
-              <a:rPr lang="en-US" dirty="0" smtClean="0"/>
+              <a:rPr lang="en-US" smtClean="0"/>
               <a:t>Evaluating alternate fitness measures</a:t>
             </a:r>
           </a:p>
           <a:p>
             <a:r>
-              <a:rPr lang="en-US" dirty="0" smtClean="0"/>
+              <a:rPr lang="en-US" smtClean="0"/>
               <a:t>Improve </a:t>
             </a:r>
             <a:r>
-              <a:rPr lang="en-US" dirty="0" err="1" smtClean="0"/>
+              <a:rPr lang="en-US" err="1" smtClean="0"/>
               <a:t>WoC</a:t>
             </a:r>
             <a:r>
-              <a:rPr lang="en-US" dirty="0" smtClean="0"/>
+              <a:rPr lang="en-US" smtClean="0"/>
               <a:t> generated solution</a:t>
             </a:r>
-            <a:endParaRPr lang="en-US" dirty="0"/>
+            <a:endParaRPr lang="en-US"/>
           </a:p>
         </p:txBody>
       </p:sp>
@@ -5721,10 +6023,10 @@
           <a:lstStyle/>
           <a:p>
             <a:r>
-              <a:rPr lang="en-US" dirty="0" smtClean="0"/>
+              <a:rPr lang="en-US" smtClean="0"/>
               <a:t>References</a:t>
             </a:r>
-            <a:endParaRPr lang="en-US" dirty="0"/>
+            <a:endParaRPr lang="en-US"/>
           </a:p>
         </p:txBody>
       </p:sp>
@@ -5741,7 +6043,7 @@
         <p:spPr/>
         <p:txBody>
           <a:bodyPr>
-            <a:normAutofit fontScale="70000" lnSpcReduction="20000"/>
+            <a:normAutofit fontScale="85000" lnSpcReduction="20000"/>
           </a:bodyPr>
           <a:lstStyle/>
           <a:p>
@@ -5749,53 +6051,53 @@
               <a:buNone/>
             </a:pPr>
             <a:r>
-              <a:rPr lang="en-US" dirty="0" smtClean="0"/>
+              <a:rPr lang="en-US" smtClean="0"/>
               <a:t>M</a:t>
             </a:r>
             <a:r>
-              <a:rPr lang="en-US" dirty="0"/>
+              <a:rPr lang="en-US"/>
               <a:t>. </a:t>
             </a:r>
             <a:r>
-              <a:rPr lang="en-US" dirty="0" err="1"/>
+              <a:rPr lang="en-US" err="1"/>
               <a:t>Hristakeva</a:t>
             </a:r>
             <a:r>
-              <a:rPr lang="en-US" dirty="0"/>
+              <a:rPr lang="en-US"/>
               <a:t>, D. </a:t>
             </a:r>
             <a:r>
-              <a:rPr lang="en-US" dirty="0" err="1" smtClean="0"/>
+              <a:rPr lang="en-US" err="1" smtClean="0"/>
               <a:t>Shrestha.</a:t>
             </a:r>
             <a:r>
-              <a:rPr lang="en-US" u="sng" dirty="0" err="1" smtClean="0">
+              <a:rPr lang="en-US" u="sng" err="1" smtClean="0">
                 <a:hlinkClick r:id="rId3"/>
               </a:rPr>
               <a:t>Solving</a:t>
             </a:r>
             <a:r>
-              <a:rPr lang="en-US" u="sng" dirty="0" smtClean="0">
+              <a:rPr lang="en-US" u="sng" smtClean="0">
                 <a:hlinkClick r:id="rId3"/>
               </a:rPr>
               <a:t> </a:t>
             </a:r>
             <a:r>
-              <a:rPr lang="en-US" u="sng" dirty="0">
+              <a:rPr lang="en-US" u="sng">
                 <a:hlinkClick r:id="rId3"/>
               </a:rPr>
               <a:t>the 0-1 knapsack problem with genetic algorithms</a:t>
             </a:r>
             <a:r>
-              <a:rPr lang="en-US" dirty="0"/>
+              <a:rPr lang="en-US"/>
               <a:t>." </a:t>
             </a:r>
             <a:r>
-              <a:rPr lang="en-US" i="1" dirty="0"/>
+              <a:rPr lang="en-US" i="1"/>
               <a:t>Midwest Instruction and Computing Symposium</a:t>
             </a:r>
             <a:r>
-              <a:rPr lang="en-US" dirty="0"/>
+              <a:rPr lang="en-US"/>
               <a:t>. 2004.</a:t>
             </a:r>
           </a:p>
@@ -5804,7 +6106,7 @@
               <a:buNone/>
             </a:pPr>
             <a:r>
-              <a:rPr lang="en-US" dirty="0"/>
+              <a:rPr lang="en-US"/>
               <a:t> </a:t>
             </a:r>
           </a:p>
@@ -5813,37 +6115,37 @@
               <a:buNone/>
             </a:pPr>
             <a:r>
-              <a:rPr lang="en-US" u="sng" dirty="0" smtClean="0">
+              <a:rPr lang="en-US" u="sng" smtClean="0">
                 <a:hlinkClick r:id="rId4" tooltip="Richard M. Karp"/>
               </a:rPr>
               <a:t>Richard </a:t>
             </a:r>
             <a:r>
-              <a:rPr lang="en-US" u="sng" dirty="0">
+              <a:rPr lang="en-US" u="sng">
                 <a:hlinkClick r:id="rId4" tooltip="Richard M. Karp"/>
               </a:rPr>
               <a:t>M. Karp</a:t>
             </a:r>
             <a:r>
-              <a:rPr lang="en-US" dirty="0"/>
+              <a:rPr lang="en-US"/>
               <a:t> (1972). </a:t>
             </a:r>
             <a:r>
-              <a:rPr lang="en-US" u="sng" dirty="0">
+              <a:rPr lang="en-US" u="sng">
                 <a:hlinkClick r:id="rId5"/>
               </a:rPr>
               <a:t>"Reducibility Among Combinatorial Problems"</a:t>
             </a:r>
             <a:r>
-              <a:rPr lang="en-US" dirty="0"/>
+              <a:rPr lang="en-US"/>
               <a:t>. In R. E. Miller and J. W. Thatcher (editors). </a:t>
             </a:r>
             <a:r>
-              <a:rPr lang="en-US" i="1" dirty="0"/>
+              <a:rPr lang="en-US" i="1"/>
               <a:t>Complexity of Computer Computations</a:t>
             </a:r>
             <a:r>
-              <a:rPr lang="en-US" dirty="0"/>
+              <a:rPr lang="en-US"/>
               <a:t>. New York: Plenum. pp. 85–103.</a:t>
             </a:r>
           </a:p>
@@ -5852,7 +6154,7 @@
               <a:buNone/>
             </a:pPr>
             <a:r>
-              <a:rPr lang="en-US" dirty="0"/>
+              <a:rPr lang="en-US"/>
               <a:t> </a:t>
             </a:r>
           </a:p>
@@ -5861,27 +6163,27 @@
               <a:buNone/>
             </a:pPr>
             <a:r>
-              <a:rPr lang="en-US" u="sng" dirty="0" smtClean="0">
+              <a:rPr lang="en-US" u="sng" smtClean="0">
                 <a:hlinkClick r:id="rId6" tooltip="George Dantzig"/>
               </a:rPr>
               <a:t>George </a:t>
             </a:r>
             <a:r>
-              <a:rPr lang="en-US" u="sng" dirty="0">
+              <a:rPr lang="en-US" u="sng">
                 <a:hlinkClick r:id="rId6" tooltip="George Dantzig"/>
               </a:rPr>
               <a:t>B. Dantzig</a:t>
             </a:r>
             <a:r>
-              <a:rPr lang="en-US" dirty="0"/>
+              <a:rPr lang="en-US"/>
               <a:t>, Discrete-Variable </a:t>
             </a:r>
             <a:r>
-              <a:rPr lang="en-US" dirty="0" err="1"/>
+              <a:rPr lang="en-US" err="1"/>
               <a:t>Extremum</a:t>
             </a:r>
             <a:r>
-              <a:rPr lang="en-US" dirty="0"/>
+              <a:rPr lang="en-US"/>
               <a:t> Problems, Operations Research Vol. 5, No. 2, April 1957, pp. 266–288,</a:t>
             </a:r>
           </a:p>
@@ -5891,6 +6193,199 @@
     <p:extLst>
       <p:ext uri="{BB962C8B-B14F-4D97-AF65-F5344CB8AC3E}">
         <p14:creationId xmlns:p14="http://schemas.microsoft.com/office/powerpoint/2010/main" val="1069932616"/>
+      </p:ext>
+    </p:extLst>
+  </p:cSld>
+  <p:clrMapOvr>
+    <a:masterClrMapping/>
+  </p:clrMapOvr>
+</p:sld>
+</file>
+
+<file path=ppt/slides/slide19.xml><?xml version="1.0" encoding="utf-8"?>
+<p:sld xmlns:a="http://schemas.openxmlformats.org/drawingml/2006/main" xmlns:r="http://schemas.openxmlformats.org/officeDocument/2006/relationships" xmlns:p="http://schemas.openxmlformats.org/presentationml/2006/main">
+  <p:cSld>
+    <p:spTree>
+      <p:nvGrpSpPr>
+        <p:cNvPr id="1" name=""/>
+        <p:cNvGrpSpPr/>
+        <p:nvPr/>
+      </p:nvGrpSpPr>
+      <p:grpSpPr>
+        <a:xfrm>
+          <a:off x="0" y="0"/>
+          <a:ext cx="0" cy="0"/>
+          <a:chOff x="0" y="0"/>
+          <a:chExt cx="0" cy="0"/>
+        </a:xfrm>
+      </p:grpSpPr>
+      <p:sp>
+        <p:nvSpPr>
+          <p:cNvPr id="2" name="Title 1"/>
+          <p:cNvSpPr>
+            <a:spLocks noGrp="1"/>
+          </p:cNvSpPr>
+          <p:nvPr>
+            <p:ph type="title"/>
+          </p:nvPr>
+        </p:nvSpPr>
+        <p:spPr/>
+        <p:txBody>
+          <a:bodyPr/>
+          <a:lstStyle/>
+          <a:p>
+            <a:r>
+              <a:rPr lang="en-US" smtClean="0"/>
+              <a:t>Thank you for listening!</a:t>
+            </a:r>
+            <a:endParaRPr lang="en-US"/>
+          </a:p>
+        </p:txBody>
+      </p:sp>
+      <p:sp>
+        <p:nvSpPr>
+          <p:cNvPr id="3" name="Content Placeholder 2"/>
+          <p:cNvSpPr>
+            <a:spLocks noGrp="1"/>
+          </p:cNvSpPr>
+          <p:nvPr>
+            <p:ph idx="1"/>
+          </p:nvPr>
+        </p:nvSpPr>
+        <p:spPr/>
+        <p:txBody>
+          <a:bodyPr/>
+          <a:lstStyle/>
+          <a:p>
+            <a:pPr marL="0" indent="0">
+              <a:buNone/>
+            </a:pPr>
+            <a:endParaRPr lang="en-US"/>
+          </a:p>
+          <a:p>
+            <a:pPr marL="0" indent="0">
+              <a:buNone/>
+            </a:pPr>
+            <a:endParaRPr lang="en-US"/>
+          </a:p>
+        </p:txBody>
+      </p:sp>
+      <p:pic>
+        <p:nvPicPr>
+          <p:cNvPr id="2050" name="Picture 2" descr="C:\Users\Sarah\AppData\Local\Microsoft\Windows\Temporary Internet Files\Content.IE5\C1DGKDHF\MC900363168[1].wmf"/>
+          <p:cNvPicPr>
+            <a:picLocks noChangeAspect="1" noChangeArrowheads="1"/>
+          </p:cNvPicPr>
+          <p:nvPr/>
+        </p:nvPicPr>
+        <p:blipFill>
+          <a:blip r:embed="rId2" cstate="print">
+            <a:extLst>
+              <a:ext uri="{28A0092B-C50C-407E-A947-70E740481C1C}">
+                <a14:useLocalDpi xmlns:a14="http://schemas.microsoft.com/office/drawing/2010/main" val="0"/>
+              </a:ext>
+            </a:extLst>
+          </a:blip>
+          <a:srcRect/>
+          <a:stretch>
+            <a:fillRect/>
+          </a:stretch>
+        </p:blipFill>
+        <p:spPr bwMode="auto">
+          <a:xfrm>
+            <a:off x="3871112" y="2506370"/>
+            <a:ext cx="1401775" cy="1845259"/>
+          </a:xfrm>
+          <a:prstGeom prst="rect">
+            <a:avLst/>
+          </a:prstGeom>
+          <a:noFill/>
+          <a:extLst>
+            <a:ext uri="{909E8E84-426E-40DD-AFC4-6F175D3DCCD1}">
+              <a14:hiddenFill xmlns:a14="http://schemas.microsoft.com/office/drawing/2010/main">
+                <a:solidFill>
+                  <a:srgbClr val="FFFFFF"/>
+                </a:solidFill>
+              </a14:hiddenFill>
+            </a:ext>
+          </a:extLst>
+        </p:spPr>
+      </p:pic>
+      <p:pic>
+        <p:nvPicPr>
+          <p:cNvPr id="2051" name="Picture 3" descr="C:\Users\Sarah\AppData\Local\Microsoft\Windows\Temporary Internet Files\Content.IE5\C1DGKDHF\MC900363168[1].wmf"/>
+          <p:cNvPicPr>
+            <a:picLocks noChangeAspect="1" noChangeArrowheads="1"/>
+          </p:cNvPicPr>
+          <p:nvPr/>
+        </p:nvPicPr>
+        <p:blipFill>
+          <a:blip r:embed="rId2" cstate="print">
+            <a:extLst>
+              <a:ext uri="{28A0092B-C50C-407E-A947-70E740481C1C}">
+                <a14:useLocalDpi xmlns:a14="http://schemas.microsoft.com/office/drawing/2010/main" val="0"/>
+              </a:ext>
+            </a:extLst>
+          </a:blip>
+          <a:srcRect/>
+          <a:stretch>
+            <a:fillRect/>
+          </a:stretch>
+        </p:blipFill>
+        <p:spPr bwMode="auto">
+          <a:xfrm>
+            <a:off x="3733800" y="1824684"/>
+            <a:ext cx="2437477" cy="3208630"/>
+          </a:xfrm>
+          <a:prstGeom prst="rect">
+            <a:avLst/>
+          </a:prstGeom>
+          <a:noFill/>
+          <a:extLst>
+            <a:ext uri="{909E8E84-426E-40DD-AFC4-6F175D3DCCD1}">
+              <a14:hiddenFill xmlns:a14="http://schemas.microsoft.com/office/drawing/2010/main">
+                <a:solidFill>
+                  <a:srgbClr val="FFFFFF"/>
+                </a:solidFill>
+              </a14:hiddenFill>
+            </a:ext>
+          </a:extLst>
+        </p:spPr>
+      </p:pic>
+      <p:sp>
+        <p:nvSpPr>
+          <p:cNvPr id="4" name="TextBox 3"/>
+          <p:cNvSpPr txBox="1"/>
+          <p:nvPr/>
+        </p:nvSpPr>
+        <p:spPr>
+          <a:xfrm>
+            <a:off x="3276600" y="5554394"/>
+            <a:ext cx="3984674" cy="646331"/>
+          </a:xfrm>
+          <a:prstGeom prst="rect">
+            <a:avLst/>
+          </a:prstGeom>
+          <a:noFill/>
+        </p:spPr>
+        <p:txBody>
+          <a:bodyPr wrap="square" rtlCol="0">
+            <a:spAutoFit/>
+          </a:bodyPr>
+          <a:lstStyle/>
+          <a:p>
+            <a:r>
+              <a:rPr lang="en-US" sz="3600" smtClean="0"/>
+              <a:t>Any Questions?</a:t>
+            </a:r>
+            <a:endParaRPr lang="en-US" sz="3600"/>
+          </a:p>
+        </p:txBody>
+      </p:sp>
+    </p:spTree>
+    <p:extLst>
+      <p:ext uri="{BB962C8B-B14F-4D97-AF65-F5344CB8AC3E}">
+        <p14:creationId xmlns:p14="http://schemas.microsoft.com/office/powerpoint/2010/main" val="1245005285"/>
       </p:ext>
     </p:extLst>
   </p:cSld>
@@ -5933,10 +6428,10 @@
           <a:lstStyle/>
           <a:p>
             <a:r>
-              <a:rPr lang="en-US" dirty="0" smtClean="0"/>
+              <a:rPr lang="en-US" smtClean="0"/>
               <a:t>Agenda</a:t>
             </a:r>
-            <a:endParaRPr lang="en-US" dirty="0"/>
+            <a:endParaRPr lang="en-US"/>
           </a:p>
         </p:txBody>
       </p:sp>
@@ -5958,118 +6453,108 @@
           <a:lstStyle/>
           <a:p>
             <a:r>
-              <a:rPr lang="en-US" dirty="0" smtClean="0"/>
+              <a:rPr lang="en-US" smtClean="0"/>
               <a:t>Knapsack Problem</a:t>
             </a:r>
           </a:p>
           <a:p>
             <a:pPr lvl="1"/>
             <a:r>
-              <a:rPr lang="en-US" dirty="0" smtClean="0"/>
+              <a:rPr lang="en-US" smtClean="0"/>
               <a:t>Variations</a:t>
             </a:r>
           </a:p>
           <a:p>
             <a:pPr lvl="1"/>
             <a:r>
-              <a:rPr lang="en-US" dirty="0" smtClean="0"/>
+              <a:rPr lang="en-US" smtClean="0"/>
               <a:t>Applications</a:t>
             </a:r>
-            <a:endParaRPr lang="en-US" dirty="0" smtClean="0"/>
           </a:p>
           <a:p>
             <a:pPr lvl="1"/>
             <a:r>
-              <a:rPr lang="en-US" dirty="0" smtClean="0"/>
+              <a:rPr lang="en-US" smtClean="0"/>
               <a:t>Complexity</a:t>
             </a:r>
           </a:p>
           <a:p>
             <a:pPr lvl="1"/>
             <a:r>
-              <a:rPr lang="en-US" dirty="0" smtClean="0"/>
+              <a:rPr lang="en-US" smtClean="0"/>
               <a:t>Solutions</a:t>
             </a:r>
-            <a:endParaRPr lang="en-US" dirty="0" smtClean="0"/>
-          </a:p>
-          <a:p>
-            <a:r>
-              <a:rPr lang="en-US" dirty="0" smtClean="0"/>
-              <a:t>Our </a:t>
-            </a:r>
-            <a:r>
-              <a:rPr lang="en-US" dirty="0" smtClean="0"/>
-              <a:t>Solution – Genetic Algorithm &amp; Wisdom of Crowds</a:t>
+          </a:p>
+          <a:p>
+            <a:r>
+              <a:rPr lang="en-US" smtClean="0"/>
+              <a:t>Our Solution – Genetic Algorithm &amp; Wisdom of Crowds</a:t>
             </a:r>
           </a:p>
           <a:p>
             <a:pPr lvl="1"/>
             <a:r>
-              <a:rPr lang="en-US" dirty="0" smtClean="0"/>
+              <a:rPr lang="en-US" smtClean="0"/>
               <a:t>Encoding</a:t>
             </a:r>
           </a:p>
           <a:p>
             <a:pPr lvl="1"/>
             <a:r>
-              <a:rPr lang="en-US" dirty="0" smtClean="0"/>
-              <a:t>Fitness </a:t>
-            </a:r>
-            <a:r>
-              <a:rPr lang="en-US" dirty="0" smtClean="0"/>
-              <a:t>Function</a:t>
+              <a:rPr lang="en-US" smtClean="0"/>
+              <a:t>Fitness Function</a:t>
             </a:r>
           </a:p>
           <a:p>
             <a:pPr lvl="1"/>
             <a:r>
-              <a:rPr lang="en-US" dirty="0" smtClean="0"/>
+              <a:rPr lang="en-US" smtClean="0"/>
               <a:t>Mutation</a:t>
             </a:r>
           </a:p>
           <a:p>
             <a:pPr lvl="1"/>
             <a:r>
-              <a:rPr lang="en-US" dirty="0" smtClean="0"/>
+              <a:rPr lang="en-US" smtClean="0"/>
               <a:t>Crossover</a:t>
             </a:r>
           </a:p>
           <a:p>
             <a:pPr lvl="1"/>
             <a:r>
-              <a:rPr lang="en-US" dirty="0" smtClean="0"/>
+              <a:rPr lang="en-US" smtClean="0"/>
               <a:t>Crowd Wisdom</a:t>
             </a:r>
           </a:p>
           <a:p>
             <a:r>
-              <a:rPr lang="en-US" dirty="0" smtClean="0"/>
+              <a:rPr lang="en-US" smtClean="0"/>
               <a:t>Results</a:t>
             </a:r>
           </a:p>
           <a:p>
             <a:r>
-              <a:rPr lang="en-US" dirty="0" smtClean="0"/>
+              <a:rPr lang="en-US" smtClean="0"/>
               <a:t>Further Areas for Research</a:t>
             </a:r>
           </a:p>
           <a:p>
             <a:r>
-              <a:rPr lang="en-US" dirty="0" smtClean="0"/>
+              <a:rPr lang="en-US" smtClean="0"/>
               <a:t>References</a:t>
             </a:r>
           </a:p>
           <a:p>
-            <a:endParaRPr lang="en-US" dirty="0" smtClean="0"/>
-          </a:p>
-          <a:p>
-            <a:endParaRPr lang="en-US" dirty="0" smtClean="0"/>
+            <a:endParaRPr lang="en-US" smtClean="0"/>
+          </a:p>
+          <a:p>
+            <a:endParaRPr lang="en-US" smtClean="0"/>
           </a:p>
           <a:p>
             <a:pPr marL="0" indent="0">
               <a:buNone/>
             </a:pPr>
-            <a:endParaRPr lang="en-US" dirty="0"/>
+            <a:endParaRPr lang="en-US"/>
           </a:p>
         </p:txBody>
       </p:sp>
@@ -6121,29 +6606,29 @@
           <a:lstStyle/>
           <a:p>
             <a:r>
-              <a:rPr lang="en-US" dirty="0"/>
+              <a:rPr lang="en-US"/>
               <a:t>Multi-Objective </a:t>
             </a:r>
             <a:r>
-              <a:rPr lang="en-US" dirty="0" smtClean="0"/>
+              <a:rPr lang="en-US" smtClean="0"/>
               <a:t/>
             </a:r>
             <a:br>
-              <a:rPr lang="en-US" dirty="0" smtClean="0"/>
+              <a:rPr lang="en-US" smtClean="0"/>
             </a:br>
             <a:r>
-              <a:rPr lang="en-US" dirty="0" smtClean="0"/>
+              <a:rPr lang="en-US" smtClean="0"/>
               <a:t>0</a:t>
             </a:r>
             <a:r>
-              <a:rPr lang="en-US" dirty="0"/>
+              <a:rPr lang="en-US"/>
               <a:t>-1 Knapsack </a:t>
             </a:r>
             <a:r>
-              <a:rPr lang="en-US" dirty="0" smtClean="0"/>
+              <a:rPr lang="en-US" smtClean="0"/>
               <a:t>Problem (MOKP)</a:t>
             </a:r>
-            <a:endParaRPr lang="en-US" dirty="0"/>
+            <a:endParaRPr lang="en-US"/>
           </a:p>
         </p:txBody>
       </p:sp>
@@ -6170,75 +6655,75 @@
           <a:lstStyle/>
           <a:p>
             <a:r>
-              <a:rPr lang="en-US" b="1" dirty="0" smtClean="0"/>
+              <a:rPr lang="en-US" b="1" smtClean="0"/>
               <a:t>General Knapsack Problem:</a:t>
             </a:r>
             <a:br>
-              <a:rPr lang="en-US" b="1" dirty="0" smtClean="0"/>
+              <a:rPr lang="en-US" b="1" smtClean="0"/>
             </a:br>
             <a:r>
-              <a:rPr lang="en-US" dirty="0" smtClean="0"/>
+              <a:rPr lang="en-US" smtClean="0"/>
               <a:t>How can you fill a knapsack with </a:t>
             </a:r>
             <a:r>
-              <a:rPr lang="en-US" i="1" dirty="0" smtClean="0"/>
+              <a:rPr lang="en-US" i="1" smtClean="0"/>
               <a:t>n</a:t>
             </a:r>
             <a:r>
-              <a:rPr lang="en-US" dirty="0" smtClean="0"/>
+              <a:rPr lang="en-US" smtClean="0"/>
               <a:t> items so that the total value is maximized without exceeding the knapsack’s capacity?</a:t>
             </a:r>
           </a:p>
           <a:p>
-            <a:endParaRPr lang="en-US" dirty="0" smtClean="0"/>
-          </a:p>
-          <a:p>
-            <a:r>
-              <a:rPr lang="en-US" b="1" dirty="0" smtClean="0"/>
+            <a:endParaRPr lang="en-US" smtClean="0"/>
+          </a:p>
+          <a:p>
+            <a:r>
+              <a:rPr lang="en-US" b="1" smtClean="0"/>
               <a:t>0-1 Variation: </a:t>
             </a:r>
             <a:br>
-              <a:rPr lang="en-US" b="1" dirty="0" smtClean="0"/>
+              <a:rPr lang="en-US" b="1" smtClean="0"/>
             </a:br>
             <a:r>
-              <a:rPr lang="en-US" dirty="0" smtClean="0"/>
+              <a:rPr lang="en-US" smtClean="0"/>
               <a:t>Only </a:t>
             </a:r>
             <a:r>
-              <a:rPr lang="en-US" dirty="0"/>
+              <a:rPr lang="en-US"/>
               <a:t>one instance of </a:t>
             </a:r>
             <a:r>
-              <a:rPr lang="en-US" dirty="0" smtClean="0"/>
+              <a:rPr lang="en-US" smtClean="0"/>
               <a:t>a specific item can </a:t>
             </a:r>
             <a:r>
-              <a:rPr lang="en-US" dirty="0"/>
+              <a:rPr lang="en-US"/>
               <a:t>appear in the </a:t>
             </a:r>
             <a:r>
-              <a:rPr lang="en-US" dirty="0" smtClean="0"/>
+              <a:rPr lang="en-US" smtClean="0"/>
               <a:t>knapsack.</a:t>
             </a:r>
           </a:p>
           <a:p>
-            <a:endParaRPr lang="en-US" dirty="0" smtClean="0"/>
-          </a:p>
-          <a:p>
-            <a:r>
-              <a:rPr lang="en-US" b="1" dirty="0" smtClean="0"/>
+            <a:endParaRPr lang="en-US" smtClean="0"/>
+          </a:p>
+          <a:p>
+            <a:r>
+              <a:rPr lang="en-US" b="1" smtClean="0"/>
               <a:t>Multi-Objective Variation:</a:t>
             </a:r>
             <a:br>
-              <a:rPr lang="en-US" b="1" dirty="0" smtClean="0"/>
+              <a:rPr lang="en-US" b="1" smtClean="0"/>
             </a:br>
             <a:r>
-              <a:rPr lang="en-US" dirty="0" smtClean="0"/>
+              <a:rPr lang="en-US" smtClean="0"/>
               <a:t>Optimize the solution so that value is maximized as well as other objectives.</a:t>
             </a:r>
           </a:p>
           <a:p>
-            <a:endParaRPr lang="en-US" dirty="0" smtClean="0"/>
+            <a:endParaRPr lang="en-US" smtClean="0"/>
           </a:p>
         </p:txBody>
       </p:sp>
@@ -6314,10 +6799,10 @@
           <a:lstStyle/>
           <a:p>
             <a:r>
-              <a:rPr lang="en-US" dirty="0" smtClean="0"/>
+              <a:rPr lang="en-US" smtClean="0"/>
               <a:t>Applications of Knapsack</a:t>
             </a:r>
-            <a:endParaRPr lang="en-US" dirty="0"/>
+            <a:endParaRPr lang="en-US"/>
           </a:p>
         </p:txBody>
       </p:sp>
@@ -6339,48 +6824,48 @@
         </p:spPr>
         <p:txBody>
           <a:bodyPr>
-            <a:normAutofit fontScale="92500" lnSpcReduction="10000"/>
+            <a:normAutofit fontScale="92500"/>
           </a:bodyPr>
           <a:lstStyle/>
           <a:p>
             <a:r>
-              <a:rPr lang="en-US" dirty="0" smtClean="0"/>
+              <a:rPr lang="en-US" smtClean="0"/>
               <a:t>Allocating </a:t>
             </a:r>
             <a:r>
-              <a:rPr lang="en-US" dirty="0"/>
+              <a:rPr lang="en-US"/>
               <a:t>investments</a:t>
             </a:r>
           </a:p>
           <a:p>
             <a:r>
-              <a:rPr lang="en-US" dirty="0"/>
+              <a:rPr lang="en-US"/>
               <a:t>Finding least wasteful way to cut raw materials</a:t>
             </a:r>
           </a:p>
           <a:p>
             <a:r>
-              <a:rPr lang="en-US" dirty="0"/>
+              <a:rPr lang="en-US"/>
               <a:t>Loading </a:t>
             </a:r>
             <a:r>
-              <a:rPr lang="en-US" dirty="0" smtClean="0"/>
+              <a:rPr lang="en-US" smtClean="0"/>
               <a:t>airplanes or trucks with packages</a:t>
             </a:r>
           </a:p>
           <a:p>
             <a:r>
-              <a:rPr lang="en-US" dirty="0" smtClean="0"/>
+              <a:rPr lang="en-US" smtClean="0"/>
               <a:t>Cryptography</a:t>
             </a:r>
           </a:p>
           <a:p>
             <a:r>
-              <a:rPr lang="en-US" dirty="0" smtClean="0"/>
+              <a:rPr lang="en-US" smtClean="0"/>
               <a:t>Any </a:t>
             </a:r>
             <a:r>
-              <a:rPr lang="en-US" dirty="0"/>
+              <a:rPr lang="en-US"/>
               <a:t>resource allocation problem with financial and/or physical constraints</a:t>
             </a:r>
           </a:p>
@@ -6489,15 +6974,15 @@
         <p:spPr/>
         <p:txBody>
           <a:bodyPr>
-            <a:normAutofit fontScale="90000"/>
+            <a:normAutofit/>
           </a:bodyPr>
           <a:lstStyle/>
           <a:p>
             <a:r>
-              <a:rPr lang="en-US" dirty="0" smtClean="0"/>
+              <a:rPr lang="en-US" smtClean="0"/>
               <a:t>Complexity of Knapsack Problem</a:t>
             </a:r>
-            <a:endParaRPr lang="en-US" dirty="0"/>
+            <a:endParaRPr lang="en-US"/>
           </a:p>
         </p:txBody>
       </p:sp>
@@ -6524,34 +7009,34 @@
           <a:lstStyle/>
           <a:p>
             <a:r>
-              <a:rPr lang="en-US" dirty="0" smtClean="0"/>
+              <a:rPr lang="en-US" smtClean="0"/>
               <a:t>Decision Problem: Can a value of at least V be achieved without exceeding the weight W?</a:t>
             </a:r>
           </a:p>
           <a:p>
             <a:pPr lvl="1"/>
             <a:r>
-              <a:rPr lang="en-US" b="1" dirty="0" smtClean="0"/>
+              <a:rPr lang="en-US" b="1" smtClean="0"/>
               <a:t>NP</a:t>
             </a:r>
             <a:r>
-              <a:rPr lang="en-US" b="1" dirty="0"/>
+              <a:rPr lang="en-US" b="1"/>
               <a:t>-</a:t>
             </a:r>
             <a:r>
-              <a:rPr lang="en-US" b="1" dirty="0" smtClean="0"/>
+              <a:rPr lang="en-US" b="1" smtClean="0"/>
               <a:t>complete </a:t>
             </a:r>
             <a:r>
-              <a:rPr lang="en-US" dirty="0" smtClean="0"/>
+              <a:rPr lang="en-US" smtClean="0"/>
               <a:t>= </a:t>
             </a:r>
             <a:r>
-              <a:rPr lang="en-US" dirty="0"/>
+              <a:rPr lang="en-US"/>
               <a:t>there is no possible algorithm both correct and fast (polynomial-time) on all </a:t>
             </a:r>
             <a:r>
-              <a:rPr lang="en-US" dirty="0" smtClean="0"/>
+              <a:rPr lang="en-US" smtClean="0"/>
               <a:t>cases</a:t>
             </a:r>
           </a:p>
@@ -6559,60 +7044,52 @@
             <a:pPr marL="0" indent="0">
               <a:buNone/>
             </a:pPr>
-            <a:endParaRPr lang="en-US" dirty="0" smtClean="0"/>
-          </a:p>
-          <a:p>
-            <a:r>
-              <a:rPr lang="en-US" dirty="0" smtClean="0"/>
+            <a:endParaRPr lang="en-US" smtClean="0"/>
+          </a:p>
+          <a:p>
+            <a:r>
+              <a:rPr lang="en-US" smtClean="0"/>
               <a:t>Optimization Problem: Find the optimal packing of a knapsack to maximize the value V without exceeding weight W.  </a:t>
             </a:r>
           </a:p>
           <a:p>
             <a:pPr lvl="1"/>
             <a:r>
-              <a:rPr lang="en-US" b="1" dirty="0" smtClean="0"/>
+              <a:rPr lang="en-US" b="1" smtClean="0"/>
               <a:t>NP-hard </a:t>
             </a:r>
             <a:r>
-              <a:rPr lang="en-US" dirty="0" smtClean="0"/>
+              <a:rPr lang="en-US" smtClean="0"/>
               <a:t>(Non</a:t>
             </a:r>
             <a:r>
-              <a:rPr lang="en-US" dirty="0"/>
+              <a:rPr lang="en-US"/>
               <a:t>-deterministic Polynomial-time </a:t>
             </a:r>
             <a:r>
-              <a:rPr lang="en-US" dirty="0" smtClean="0"/>
-              <a:t>hard) </a:t>
-            </a:r>
-            <a:r>
-              <a:rPr lang="en-US" dirty="0" smtClean="0"/>
-              <a:t>= At </a:t>
-            </a:r>
-            <a:r>
-              <a:rPr lang="en-US" dirty="0" smtClean="0"/>
-              <a:t>least as hard (or harder!) as the hardest problems in NP. </a:t>
+              <a:rPr lang="en-US" smtClean="0"/>
+              <a:t>hard) = At least as hard (or harder!) as the hardest problems in NP. </a:t>
             </a:r>
           </a:p>
           <a:p>
             <a:pPr lvl="1"/>
             <a:r>
-              <a:rPr lang="en-US" dirty="0" smtClean="0"/>
+              <a:rPr lang="en-US" smtClean="0"/>
               <a:t>There </a:t>
             </a:r>
             <a:r>
-              <a:rPr lang="en-US" dirty="0"/>
+              <a:rPr lang="en-US"/>
               <a:t>is no known polynomial algorithm which can tell, given a solution, whether it is </a:t>
             </a:r>
             <a:r>
-              <a:rPr lang="en-US" dirty="0" smtClean="0"/>
+              <a:rPr lang="en-US" smtClean="0"/>
               <a:t>optimal.</a:t>
             </a:r>
           </a:p>
           <a:p>
             <a:pPr lvl="1"/>
             <a:r>
-              <a:rPr lang="en-US" dirty="0" smtClean="0"/>
+              <a:rPr lang="en-US" smtClean="0"/>
               <a:t>Our old friend the Traveling Salesman is also NP-hard.</a:t>
             </a:r>
           </a:p>
@@ -6691,15 +7168,15 @@
         <p:spPr/>
         <p:txBody>
           <a:bodyPr>
-            <a:normAutofit fontScale="90000"/>
+            <a:normAutofit/>
           </a:bodyPr>
           <a:lstStyle/>
           <a:p>
             <a:r>
-              <a:rPr lang="en-US" dirty="0" smtClean="0"/>
+              <a:rPr lang="en-US" smtClean="0"/>
               <a:t>Pseudo-Polynomial Time Solutions</a:t>
             </a:r>
-            <a:endParaRPr lang="en-US" dirty="0"/>
+            <a:endParaRPr lang="en-US"/>
           </a:p>
         </p:txBody>
       </p:sp>
@@ -6726,32 +7203,31 @@
           <a:lstStyle/>
           <a:p>
             <a:r>
-              <a:rPr lang="en-US" dirty="0" smtClean="0"/>
+              <a:rPr lang="en-US" smtClean="0"/>
               <a:t>Greedy Algorithm (not optimal)</a:t>
             </a:r>
           </a:p>
           <a:p>
             <a:r>
-              <a:rPr lang="en-US" dirty="0" smtClean="0"/>
+              <a:rPr lang="en-US" smtClean="0"/>
               <a:t>Dynamic Programming (optimal, similar to Brute Force but more efficient)</a:t>
             </a:r>
           </a:p>
           <a:p>
             <a:r>
-              <a:rPr lang="en-US" dirty="0" smtClean="0"/>
+              <a:rPr lang="en-US" smtClean="0"/>
               <a:t>Allow approximation (near-optimal solutions) – </a:t>
             </a:r>
             <a:r>
-              <a:rPr lang="en-US" b="1" dirty="0" smtClean="0"/>
+              <a:rPr lang="en-US" b="1" smtClean="0"/>
               <a:t>Genetic Algorithms</a:t>
             </a:r>
           </a:p>
           <a:p>
             <a:r>
-              <a:rPr lang="en-US" dirty="0" smtClean="0"/>
+              <a:rPr lang="en-US" smtClean="0"/>
               <a:t>Reduce search space by using dominance relations to remove items that will never be used by best solutions</a:t>
             </a:r>
-            <a:endParaRPr lang="en-US" dirty="0" smtClean="0"/>
           </a:p>
         </p:txBody>
       </p:sp>
@@ -6838,10 +7314,10 @@
           <a:lstStyle/>
           <a:p>
             <a:r>
-              <a:rPr lang="en-US" dirty="0" smtClean="0"/>
+              <a:rPr lang="en-US" smtClean="0"/>
               <a:t>Relevant XKCD Comic</a:t>
             </a:r>
-            <a:endParaRPr lang="en-US" dirty="0"/>
+            <a:endParaRPr lang="en-US"/>
           </a:p>
         </p:txBody>
       </p:sp>
@@ -6891,7 +7367,7 @@
           <a:lstStyle/>
           <a:p>
             <a:r>
-              <a:rPr lang="en-US" dirty="0"/>
+              <a:rPr lang="en-US"/>
               <a:t>Our Example: Grocery Store</a:t>
             </a:r>
           </a:p>
@@ -6920,66 +7396,61 @@
           <a:lstStyle/>
           <a:p>
             <a:r>
-              <a:rPr lang="en-US" dirty="0" smtClean="0"/>
+              <a:rPr lang="en-US" smtClean="0"/>
               <a:t>Given </a:t>
             </a:r>
             <a:r>
-              <a:rPr lang="en-US" dirty="0"/>
+              <a:rPr lang="en-US"/>
               <a:t>a grocery store’s worth of items, how can we most efficiently fill our </a:t>
             </a:r>
             <a:r>
-              <a:rPr lang="en-US" dirty="0" smtClean="0"/>
+              <a:rPr lang="en-US" smtClean="0"/>
               <a:t>grocery bag with n items </a:t>
             </a:r>
             <a:r>
-              <a:rPr lang="en-US" dirty="0"/>
+              <a:rPr lang="en-US"/>
               <a:t>that </a:t>
             </a:r>
             <a:r>
-              <a:rPr lang="en-US" dirty="0" smtClean="0"/>
+              <a:rPr lang="en-US" smtClean="0"/>
               <a:t>are high </a:t>
             </a:r>
             <a:r>
-              <a:rPr lang="en-US" b="1" dirty="0"/>
+              <a:rPr lang="en-US" b="1"/>
               <a:t>in nutritional value</a:t>
             </a:r>
             <a:r>
-              <a:rPr lang="en-US" dirty="0"/>
+              <a:rPr lang="en-US"/>
               <a:t>, low in </a:t>
             </a:r>
             <a:r>
-              <a:rPr lang="en-US" b="1" dirty="0"/>
+              <a:rPr lang="en-US" b="1"/>
               <a:t>price</a:t>
             </a:r>
             <a:r>
-              <a:rPr lang="en-US" dirty="0"/>
+              <a:rPr lang="en-US"/>
               <a:t>, and low in </a:t>
             </a:r>
             <a:r>
-              <a:rPr lang="en-US" b="1" dirty="0"/>
+              <a:rPr lang="en-US" b="1"/>
               <a:t>weight</a:t>
             </a:r>
             <a:r>
-              <a:rPr lang="en-US" dirty="0" smtClean="0"/>
+              <a:rPr lang="en-US" smtClean="0"/>
               <a:t>?</a:t>
             </a:r>
           </a:p>
           <a:p>
             <a:r>
-              <a:rPr lang="en-US" dirty="0" smtClean="0"/>
-              <a:t>Use a Genetic Algorithm to evolve solutions, and the Wisdom of Crowds to find the best solution</a:t>
-            </a:r>
-            <a:r>
-              <a:rPr lang="en-US" dirty="0" smtClean="0"/>
-              <a:t> </a:t>
-            </a:r>
-            <a:endParaRPr lang="en-US" dirty="0" smtClean="0"/>
+              <a:rPr lang="en-US" smtClean="0"/>
+              <a:t>Use a Genetic Algorithm to evolve solutions, and the Wisdom of Crowds to find the best solution </a:t>
+            </a:r>
           </a:p>
           <a:p>
             <a:pPr marL="0" indent="0">
               <a:buNone/>
             </a:pPr>
-            <a:endParaRPr lang="en-US" dirty="0" smtClean="0"/>
+            <a:endParaRPr lang="en-US" smtClean="0"/>
           </a:p>
         </p:txBody>
       </p:sp>
@@ -6992,7 +7463,7 @@
           <p:nvPr/>
         </p:nvPicPr>
         <p:blipFill>
-          <a:blip r:embed="rId2">
+          <a:blip r:embed="rId3">
             <a:extLst>
               <a:ext uri="{28A0092B-C50C-407E-A947-70E740481C1C}">
                 <a14:useLocalDpi xmlns:a14="http://schemas.microsoft.com/office/drawing/2010/main" val="0"/>
@@ -7061,10 +7532,10 @@
           <a:lstStyle/>
           <a:p>
             <a:r>
-              <a:rPr lang="en-US" dirty="0" smtClean="0"/>
+              <a:rPr lang="en-US" smtClean="0"/>
               <a:t>Genetically Encoding a Solution</a:t>
             </a:r>
-            <a:endParaRPr lang="en-US" dirty="0"/>
+            <a:endParaRPr lang="en-US"/>
           </a:p>
         </p:txBody>
       </p:sp>
@@ -7077,7 +7548,7 @@
           <p:nvPr/>
         </p:nvPicPr>
         <p:blipFill>
-          <a:blip r:embed="rId2">
+          <a:blip r:embed="rId3">
             <a:extLst>
               <a:ext uri="{28A0092B-C50C-407E-A947-70E740481C1C}">
                 <a14:useLocalDpi xmlns:a14="http://schemas.microsoft.com/office/drawing/2010/main" val="0"/>
@@ -7107,7 +7578,7 @@
           <p:nvPr/>
         </p:nvPicPr>
         <p:blipFill>
-          <a:blip r:embed="rId3">
+          <a:blip r:embed="rId4" cstate="print">
             <a:extLst>
               <a:ext uri="{28A0092B-C50C-407E-A947-70E740481C1C}">
                 <a14:useLocalDpi xmlns:a14="http://schemas.microsoft.com/office/drawing/2010/main" val="0"/>
@@ -7151,10 +7622,10 @@
           <a:lstStyle/>
           <a:p>
             <a:r>
-              <a:rPr lang="en-US" dirty="0" smtClean="0"/>
+              <a:rPr lang="en-US" smtClean="0"/>
               <a:t>This Knapsack contains Orange, Milk, and Chicken.</a:t>
             </a:r>
-            <a:endParaRPr lang="en-US" dirty="0"/>
+            <a:endParaRPr lang="en-US"/>
           </a:p>
         </p:txBody>
       </p:sp>
@@ -7181,10 +7652,10 @@
           <a:lstStyle/>
           <a:p>
             <a:r>
-              <a:rPr lang="en-US" dirty="0" smtClean="0"/>
+              <a:rPr lang="en-US" smtClean="0"/>
               <a:t>[    0,                     1,                 1,                     0,                  1    ]</a:t>
             </a:r>
-            <a:endParaRPr lang="en-US" dirty="0"/>
+            <a:endParaRPr lang="en-US"/>
           </a:p>
         </p:txBody>
       </p:sp>
@@ -7211,10 +7682,10 @@
           <a:lstStyle/>
           <a:p>
             <a:r>
-              <a:rPr lang="en-US" b="1" dirty="0" smtClean="0"/>
+              <a:rPr lang="en-US" b="1" smtClean="0"/>
               <a:t>Chromosome for Solution</a:t>
             </a:r>
-            <a:endParaRPr lang="en-US" b="1" dirty="0"/>
+            <a:endParaRPr lang="en-US" b="1"/>
           </a:p>
         </p:txBody>
       </p:sp>

</xml_diff>

<commit_message>
fixed some slide formatting
</commit_message>
<xml_diff>
--- a/docs/knapsack_presentation.pptx
+++ b/docs/knapsack_presentation.pptx
@@ -942,14 +942,6 @@
           <a:bodyPr/>
           <a:lstStyle/>
           <a:p>
-            <a:r>
-              <a:rPr lang="en-US" smtClean="0"/>
-              <a:t>dynamic programming:</a:t>
-            </a:r>
-            <a:r>
-              <a:rPr lang="en-US" baseline="0" smtClean="0"/>
-              <a:t> recursion, sub-problems. remember previous calculations.</a:t>
-            </a:r>
             <a:endParaRPr lang="en-US"/>
           </a:p>
         </p:txBody>
@@ -5121,7 +5113,7 @@
           <a:graphicData uri="http://schemas.openxmlformats.org/presentationml/2006/ole">
             <mc:AlternateContent xmlns:mc="http://schemas.openxmlformats.org/markup-compatibility/2006">
               <mc:Choice xmlns:v="urn:schemas-microsoft-com:vml" Requires="v">
-                <p:oleObj spid="_x0000_s1035" name="Document" r:id="rId3" imgW="5486400" imgH="838200" progId="Word.Document.12">
+                <p:oleObj spid="_x0000_s1036" name="Document" r:id="rId3" imgW="5486400" imgH="838200" progId="Word.Document.12">
                   <p:link updateAutomatic="1"/>
                 </p:oleObj>
               </mc:Choice>
@@ -6334,7 +6326,7 @@
         </p:blipFill>
         <p:spPr bwMode="auto">
           <a:xfrm>
-            <a:off x="3733800" y="1824684"/>
+            <a:off x="3429000" y="1824684"/>
             <a:ext cx="2437477" cy="3208630"/>
           </a:xfrm>
           <a:prstGeom prst="rect">
@@ -6360,7 +6352,7 @@
         </p:nvSpPr>
         <p:spPr>
           <a:xfrm>
-            <a:off x="3276600" y="5554394"/>
+            <a:off x="3048000" y="5554394"/>
             <a:ext cx="3984674" cy="646331"/>
           </a:xfrm>
           <a:prstGeom prst="rect">

</xml_diff>

<commit_message>
switched some bullet points in "further areas"
</commit_message>
<xml_diff>
--- a/docs/knapsack_presentation.pptx
+++ b/docs/knapsack_presentation.pptx
@@ -5113,7 +5113,7 @@
           <a:graphicData uri="http://schemas.openxmlformats.org/presentationml/2006/ole">
             <mc:AlternateContent xmlns:mc="http://schemas.openxmlformats.org/markup-compatibility/2006">
               <mc:Choice xmlns:v="urn:schemas-microsoft-com:vml" Requires="v">
-                <p:oleObj spid="_x0000_s1036" name="Document" r:id="rId3" imgW="5486400" imgH="838200" progId="Word.Document.12">
+                <p:oleObj spid="_x0000_s1039" name="Document" r:id="rId3" imgW="5486400" imgH="838200" progId="Word.Document.12">
                   <p:link updateAutomatic="1"/>
                 </p:oleObj>
               </mc:Choice>
@@ -5935,14 +5935,31 @@
           <a:p>
             <a:r>
               <a:rPr lang="en-US" smtClean="0"/>
-              <a:t>Adding weights to each objective</a:t>
-            </a:r>
-          </a:p>
-          <a:p>
-            <a:r>
-              <a:rPr lang="en-US" smtClean="0"/>
-              <a:t>Increasing number of objectives</a:t>
-            </a:r>
+              <a:t>Increasing </a:t>
+            </a:r>
+            <a:r>
+              <a:rPr lang="en-US" smtClean="0"/>
+              <a:t>number of </a:t>
+            </a:r>
+            <a:r>
+              <a:rPr lang="en-US" smtClean="0"/>
+              <a:t>objectives</a:t>
+            </a:r>
+          </a:p>
+          <a:p>
+            <a:r>
+              <a:rPr lang="en-US"/>
+              <a:t>Adding weights to </a:t>
+            </a:r>
+            <a:r>
+              <a:rPr lang="en-US"/>
+              <a:t>each </a:t>
+            </a:r>
+            <a:r>
+              <a:rPr lang="en-US" smtClean="0"/>
+              <a:t>objective</a:t>
+            </a:r>
+            <a:endParaRPr lang="en-US" smtClean="0"/>
           </a:p>
           <a:p>
             <a:r>

</xml_diff>